<commit_message>
Challenge Week Presentation & Tutorial project start
</commit_message>
<xml_diff>
--- a/Challenge Week/Challenge Week Presentation.pptx
+++ b/Challenge Week/Challenge Week Presentation.pptx
@@ -4,12 +4,17 @@
   <p:sldMasterIdLst>
     <p:sldMasterId id="2147483678" r:id="rId1"/>
   </p:sldMasterIdLst>
+  <p:notesMasterIdLst>
+    <p:notesMasterId r:id="rId9"/>
+  </p:notesMasterIdLst>
   <p:sldIdLst>
     <p:sldId id="256" r:id="rId2"/>
     <p:sldId id="260" r:id="rId3"/>
-    <p:sldId id="257" r:id="rId4"/>
-    <p:sldId id="258" r:id="rId5"/>
-    <p:sldId id="259" r:id="rId6"/>
+    <p:sldId id="261" r:id="rId4"/>
+    <p:sldId id="257" r:id="rId5"/>
+    <p:sldId id="262" r:id="rId6"/>
+    <p:sldId id="258" r:id="rId7"/>
+    <p:sldId id="259" r:id="rId8"/>
   </p:sldIdLst>
   <p:sldSz cx="12192000" cy="6858000"/>
   <p:notesSz cx="6858000" cy="9144000"/>
@@ -114,6 +119,684 @@
     </p:ext>
   </p:extLst>
 </p:presentation>
+</file>
+
+<file path=ppt/notesMasters/notesMaster1.xml><?xml version="1.0" encoding="utf-8"?>
+<p:notesMaster xmlns:a="http://schemas.openxmlformats.org/drawingml/2006/main" xmlns:r="http://schemas.openxmlformats.org/officeDocument/2006/relationships" xmlns:p="http://schemas.openxmlformats.org/presentationml/2006/main">
+  <p:cSld>
+    <p:bg>
+      <p:bgRef idx="1001">
+        <a:schemeClr val="bg1"/>
+      </p:bgRef>
+    </p:bg>
+    <p:spTree>
+      <p:nvGrpSpPr>
+        <p:cNvPr id="1" name=""/>
+        <p:cNvGrpSpPr/>
+        <p:nvPr/>
+      </p:nvGrpSpPr>
+      <p:grpSpPr>
+        <a:xfrm>
+          <a:off x="0" y="0"/>
+          <a:ext cx="0" cy="0"/>
+          <a:chOff x="0" y="0"/>
+          <a:chExt cx="0" cy="0"/>
+        </a:xfrm>
+      </p:grpSpPr>
+      <p:sp>
+        <p:nvSpPr>
+          <p:cNvPr id="2" name="Header Placeholder 1"/>
+          <p:cNvSpPr>
+            <a:spLocks noGrp="1"/>
+          </p:cNvSpPr>
+          <p:nvPr>
+            <p:ph type="hdr" sz="quarter"/>
+          </p:nvPr>
+        </p:nvSpPr>
+        <p:spPr>
+          <a:xfrm>
+            <a:off x="0" y="0"/>
+            <a:ext cx="2971800" cy="458788"/>
+          </a:xfrm>
+          <a:prstGeom prst="rect">
+            <a:avLst/>
+          </a:prstGeom>
+        </p:spPr>
+        <p:txBody>
+          <a:bodyPr vert="horz" lIns="91440" tIns="45720" rIns="91440" bIns="45720" rtlCol="0"/>
+          <a:lstStyle>
+            <a:lvl1pPr algn="l">
+              <a:defRPr sz="1200"/>
+            </a:lvl1pPr>
+          </a:lstStyle>
+          <a:p>
+            <a:endParaRPr lang="en-GB"/>
+          </a:p>
+        </p:txBody>
+      </p:sp>
+      <p:sp>
+        <p:nvSpPr>
+          <p:cNvPr id="3" name="Date Placeholder 2"/>
+          <p:cNvSpPr>
+            <a:spLocks noGrp="1"/>
+          </p:cNvSpPr>
+          <p:nvPr>
+            <p:ph type="dt" idx="1"/>
+          </p:nvPr>
+        </p:nvSpPr>
+        <p:spPr>
+          <a:xfrm>
+            <a:off x="3884613" y="0"/>
+            <a:ext cx="2971800" cy="458788"/>
+          </a:xfrm>
+          <a:prstGeom prst="rect">
+            <a:avLst/>
+          </a:prstGeom>
+        </p:spPr>
+        <p:txBody>
+          <a:bodyPr vert="horz" lIns="91440" tIns="45720" rIns="91440" bIns="45720" rtlCol="0"/>
+          <a:lstStyle>
+            <a:lvl1pPr algn="r">
+              <a:defRPr sz="1200"/>
+            </a:lvl1pPr>
+          </a:lstStyle>
+          <a:p>
+            <a:fld id="{6BAAA785-8E43-4A20-A0C3-B189128ACA38}" type="datetimeFigureOut">
+              <a:rPr lang="en-GB" smtClean="0"/>
+              <a:t>13/10/2020</a:t>
+            </a:fld>
+            <a:endParaRPr lang="en-GB"/>
+          </a:p>
+        </p:txBody>
+      </p:sp>
+      <p:sp>
+        <p:nvSpPr>
+          <p:cNvPr id="4" name="Slide Image Placeholder 3"/>
+          <p:cNvSpPr>
+            <a:spLocks noGrp="1" noRot="1" noChangeAspect="1"/>
+          </p:cNvSpPr>
+          <p:nvPr>
+            <p:ph type="sldImg" idx="2"/>
+          </p:nvPr>
+        </p:nvSpPr>
+        <p:spPr>
+          <a:xfrm>
+            <a:off x="685800" y="1143000"/>
+            <a:ext cx="5486400" cy="3086100"/>
+          </a:xfrm>
+          <a:prstGeom prst="rect">
+            <a:avLst/>
+          </a:prstGeom>
+          <a:noFill/>
+          <a:ln w="12700">
+            <a:solidFill>
+              <a:prstClr val="black"/>
+            </a:solidFill>
+          </a:ln>
+        </p:spPr>
+        <p:txBody>
+          <a:bodyPr vert="horz" lIns="91440" tIns="45720" rIns="91440" bIns="45720" rtlCol="0" anchor="ctr"/>
+          <a:lstStyle/>
+          <a:p>
+            <a:endParaRPr lang="en-GB"/>
+          </a:p>
+        </p:txBody>
+      </p:sp>
+      <p:sp>
+        <p:nvSpPr>
+          <p:cNvPr id="5" name="Notes Placeholder 4"/>
+          <p:cNvSpPr>
+            <a:spLocks noGrp="1"/>
+          </p:cNvSpPr>
+          <p:nvPr>
+            <p:ph type="body" sz="quarter" idx="3"/>
+          </p:nvPr>
+        </p:nvSpPr>
+        <p:spPr>
+          <a:xfrm>
+            <a:off x="685800" y="4400550"/>
+            <a:ext cx="5486400" cy="3600450"/>
+          </a:xfrm>
+          <a:prstGeom prst="rect">
+            <a:avLst/>
+          </a:prstGeom>
+        </p:spPr>
+        <p:txBody>
+          <a:bodyPr vert="horz" lIns="91440" tIns="45720" rIns="91440" bIns="45720" rtlCol="0"/>
+          <a:lstStyle/>
+          <a:p>
+            <a:pPr lvl="0"/>
+            <a:r>
+              <a:rPr lang="en-US"/>
+              <a:t>Click to edit Master text styles</a:t>
+            </a:r>
+          </a:p>
+          <a:p>
+            <a:pPr lvl="1"/>
+            <a:r>
+              <a:rPr lang="en-US"/>
+              <a:t>Second level</a:t>
+            </a:r>
+          </a:p>
+          <a:p>
+            <a:pPr lvl="2"/>
+            <a:r>
+              <a:rPr lang="en-US"/>
+              <a:t>Third level</a:t>
+            </a:r>
+          </a:p>
+          <a:p>
+            <a:pPr lvl="3"/>
+            <a:r>
+              <a:rPr lang="en-US"/>
+              <a:t>Fourth level</a:t>
+            </a:r>
+          </a:p>
+          <a:p>
+            <a:pPr lvl="4"/>
+            <a:r>
+              <a:rPr lang="en-US"/>
+              <a:t>Fifth level</a:t>
+            </a:r>
+            <a:endParaRPr lang="en-GB"/>
+          </a:p>
+        </p:txBody>
+      </p:sp>
+      <p:sp>
+        <p:nvSpPr>
+          <p:cNvPr id="6" name="Footer Placeholder 5"/>
+          <p:cNvSpPr>
+            <a:spLocks noGrp="1"/>
+          </p:cNvSpPr>
+          <p:nvPr>
+            <p:ph type="ftr" sz="quarter" idx="4"/>
+          </p:nvPr>
+        </p:nvSpPr>
+        <p:spPr>
+          <a:xfrm>
+            <a:off x="0" y="8685213"/>
+            <a:ext cx="2971800" cy="458787"/>
+          </a:xfrm>
+          <a:prstGeom prst="rect">
+            <a:avLst/>
+          </a:prstGeom>
+        </p:spPr>
+        <p:txBody>
+          <a:bodyPr vert="horz" lIns="91440" tIns="45720" rIns="91440" bIns="45720" rtlCol="0" anchor="b"/>
+          <a:lstStyle>
+            <a:lvl1pPr algn="l">
+              <a:defRPr sz="1200"/>
+            </a:lvl1pPr>
+          </a:lstStyle>
+          <a:p>
+            <a:endParaRPr lang="en-GB"/>
+          </a:p>
+        </p:txBody>
+      </p:sp>
+      <p:sp>
+        <p:nvSpPr>
+          <p:cNvPr id="7" name="Slide Number Placeholder 6"/>
+          <p:cNvSpPr>
+            <a:spLocks noGrp="1"/>
+          </p:cNvSpPr>
+          <p:nvPr>
+            <p:ph type="sldNum" sz="quarter" idx="5"/>
+          </p:nvPr>
+        </p:nvSpPr>
+        <p:spPr>
+          <a:xfrm>
+            <a:off x="3884613" y="8685213"/>
+            <a:ext cx="2971800" cy="458787"/>
+          </a:xfrm>
+          <a:prstGeom prst="rect">
+            <a:avLst/>
+          </a:prstGeom>
+        </p:spPr>
+        <p:txBody>
+          <a:bodyPr vert="horz" lIns="91440" tIns="45720" rIns="91440" bIns="45720" rtlCol="0" anchor="b"/>
+          <a:lstStyle>
+            <a:lvl1pPr algn="r">
+              <a:defRPr sz="1200"/>
+            </a:lvl1pPr>
+          </a:lstStyle>
+          <a:p>
+            <a:fld id="{BB0EFA0C-2783-471D-8939-2BE70A2A34FC}" type="slidenum">
+              <a:rPr lang="en-GB" smtClean="0"/>
+              <a:t>‹#›</a:t>
+            </a:fld>
+            <a:endParaRPr lang="en-GB"/>
+          </a:p>
+        </p:txBody>
+      </p:sp>
+    </p:spTree>
+    <p:extLst>
+      <p:ext uri="{BB962C8B-B14F-4D97-AF65-F5344CB8AC3E}">
+        <p14:creationId xmlns:p14="http://schemas.microsoft.com/office/powerpoint/2010/main" val="295852496"/>
+      </p:ext>
+    </p:extLst>
+  </p:cSld>
+  <p:clrMap bg1="lt1" tx1="dk1" bg2="lt2" tx2="dk2" accent1="accent1" accent2="accent2" accent3="accent3" accent4="accent4" accent5="accent5" accent6="accent6" hlink="hlink" folHlink="folHlink"/>
+  <p:notesStyle>
+    <a:lvl1pPr marL="0" algn="l" defTabSz="914400" rtl="0" eaLnBrk="1" latinLnBrk="0" hangingPunct="1">
+      <a:defRPr sz="1200" kern="1200">
+        <a:solidFill>
+          <a:schemeClr val="tx1"/>
+        </a:solidFill>
+        <a:latin typeface="+mn-lt"/>
+        <a:ea typeface="+mn-ea"/>
+        <a:cs typeface="+mn-cs"/>
+      </a:defRPr>
+    </a:lvl1pPr>
+    <a:lvl2pPr marL="457200" algn="l" defTabSz="914400" rtl="0" eaLnBrk="1" latinLnBrk="0" hangingPunct="1">
+      <a:defRPr sz="1200" kern="1200">
+        <a:solidFill>
+          <a:schemeClr val="tx1"/>
+        </a:solidFill>
+        <a:latin typeface="+mn-lt"/>
+        <a:ea typeface="+mn-ea"/>
+        <a:cs typeface="+mn-cs"/>
+      </a:defRPr>
+    </a:lvl2pPr>
+    <a:lvl3pPr marL="914400" algn="l" defTabSz="914400" rtl="0" eaLnBrk="1" latinLnBrk="0" hangingPunct="1">
+      <a:defRPr sz="1200" kern="1200">
+        <a:solidFill>
+          <a:schemeClr val="tx1"/>
+        </a:solidFill>
+        <a:latin typeface="+mn-lt"/>
+        <a:ea typeface="+mn-ea"/>
+        <a:cs typeface="+mn-cs"/>
+      </a:defRPr>
+    </a:lvl3pPr>
+    <a:lvl4pPr marL="1371600" algn="l" defTabSz="914400" rtl="0" eaLnBrk="1" latinLnBrk="0" hangingPunct="1">
+      <a:defRPr sz="1200" kern="1200">
+        <a:solidFill>
+          <a:schemeClr val="tx1"/>
+        </a:solidFill>
+        <a:latin typeface="+mn-lt"/>
+        <a:ea typeface="+mn-ea"/>
+        <a:cs typeface="+mn-cs"/>
+      </a:defRPr>
+    </a:lvl4pPr>
+    <a:lvl5pPr marL="1828800" algn="l" defTabSz="914400" rtl="0" eaLnBrk="1" latinLnBrk="0" hangingPunct="1">
+      <a:defRPr sz="1200" kern="1200">
+        <a:solidFill>
+          <a:schemeClr val="tx1"/>
+        </a:solidFill>
+        <a:latin typeface="+mn-lt"/>
+        <a:ea typeface="+mn-ea"/>
+        <a:cs typeface="+mn-cs"/>
+      </a:defRPr>
+    </a:lvl5pPr>
+    <a:lvl6pPr marL="2286000" algn="l" defTabSz="914400" rtl="0" eaLnBrk="1" latinLnBrk="0" hangingPunct="1">
+      <a:defRPr sz="1200" kern="1200">
+        <a:solidFill>
+          <a:schemeClr val="tx1"/>
+        </a:solidFill>
+        <a:latin typeface="+mn-lt"/>
+        <a:ea typeface="+mn-ea"/>
+        <a:cs typeface="+mn-cs"/>
+      </a:defRPr>
+    </a:lvl6pPr>
+    <a:lvl7pPr marL="2743200" algn="l" defTabSz="914400" rtl="0" eaLnBrk="1" latinLnBrk="0" hangingPunct="1">
+      <a:defRPr sz="1200" kern="1200">
+        <a:solidFill>
+          <a:schemeClr val="tx1"/>
+        </a:solidFill>
+        <a:latin typeface="+mn-lt"/>
+        <a:ea typeface="+mn-ea"/>
+        <a:cs typeface="+mn-cs"/>
+      </a:defRPr>
+    </a:lvl7pPr>
+    <a:lvl8pPr marL="3200400" algn="l" defTabSz="914400" rtl="0" eaLnBrk="1" latinLnBrk="0" hangingPunct="1">
+      <a:defRPr sz="1200" kern="1200">
+        <a:solidFill>
+          <a:schemeClr val="tx1"/>
+        </a:solidFill>
+        <a:latin typeface="+mn-lt"/>
+        <a:ea typeface="+mn-ea"/>
+        <a:cs typeface="+mn-cs"/>
+      </a:defRPr>
+    </a:lvl8pPr>
+    <a:lvl9pPr marL="3657600" algn="l" defTabSz="914400" rtl="0" eaLnBrk="1" latinLnBrk="0" hangingPunct="1">
+      <a:defRPr sz="1200" kern="1200">
+        <a:solidFill>
+          <a:schemeClr val="tx1"/>
+        </a:solidFill>
+        <a:latin typeface="+mn-lt"/>
+        <a:ea typeface="+mn-ea"/>
+        <a:cs typeface="+mn-cs"/>
+      </a:defRPr>
+    </a:lvl9pPr>
+  </p:notesStyle>
+</p:notesMaster>
+</file>
+
+<file path=ppt/notesSlides/notesSlide1.xml><?xml version="1.0" encoding="utf-8"?>
+<p:notes xmlns:a="http://schemas.openxmlformats.org/drawingml/2006/main" xmlns:r="http://schemas.openxmlformats.org/officeDocument/2006/relationships" xmlns:p="http://schemas.openxmlformats.org/presentationml/2006/main">
+  <p:cSld>
+    <p:spTree>
+      <p:nvGrpSpPr>
+        <p:cNvPr id="1" name=""/>
+        <p:cNvGrpSpPr/>
+        <p:nvPr/>
+      </p:nvGrpSpPr>
+      <p:grpSpPr>
+        <a:xfrm>
+          <a:off x="0" y="0"/>
+          <a:ext cx="0" cy="0"/>
+          <a:chOff x="0" y="0"/>
+          <a:chExt cx="0" cy="0"/>
+        </a:xfrm>
+      </p:grpSpPr>
+      <p:sp>
+        <p:nvSpPr>
+          <p:cNvPr id="2" name="Slide Image Placeholder 1"/>
+          <p:cNvSpPr>
+            <a:spLocks noGrp="1" noRot="1" noChangeAspect="1"/>
+          </p:cNvSpPr>
+          <p:nvPr>
+            <p:ph type="sldImg"/>
+          </p:nvPr>
+        </p:nvSpPr>
+        <p:spPr/>
+      </p:sp>
+      <p:sp>
+        <p:nvSpPr>
+          <p:cNvPr id="3" name="Notes Placeholder 2"/>
+          <p:cNvSpPr>
+            <a:spLocks noGrp="1"/>
+          </p:cNvSpPr>
+          <p:nvPr>
+            <p:ph type="body" idx="1"/>
+          </p:nvPr>
+        </p:nvSpPr>
+        <p:spPr/>
+        <p:txBody>
+          <a:bodyPr/>
+          <a:lstStyle/>
+          <a:p>
+            <a:pPr marL="0" marR="0" lvl="0" indent="0" algn="l" defTabSz="914400" rtl="0" eaLnBrk="1" fontAlgn="auto" latinLnBrk="0" hangingPunct="1">
+              <a:lnSpc>
+                <a:spcPct val="100000"/>
+              </a:lnSpc>
+              <a:spcBef>
+                <a:spcPts val="0"/>
+              </a:spcBef>
+              <a:spcAft>
+                <a:spcPts val="0"/>
+              </a:spcAft>
+              <a:buClrTx/>
+              <a:buSzTx/>
+              <a:buFontTx/>
+              <a:buNone/>
+              <a:tabLst/>
+              <a:defRPr/>
+            </a:pPr>
+            <a:r>
+              <a:rPr lang="en-GB" dirty="0"/>
+              <a:t>Show what you are planning build for the whole year</a:t>
+            </a:r>
+          </a:p>
+        </p:txBody>
+      </p:sp>
+      <p:sp>
+        <p:nvSpPr>
+          <p:cNvPr id="4" name="Slide Number Placeholder 3"/>
+          <p:cNvSpPr>
+            <a:spLocks noGrp="1"/>
+          </p:cNvSpPr>
+          <p:nvPr>
+            <p:ph type="sldNum" sz="quarter" idx="5"/>
+          </p:nvPr>
+        </p:nvSpPr>
+        <p:spPr/>
+        <p:txBody>
+          <a:bodyPr/>
+          <a:lstStyle/>
+          <a:p>
+            <a:fld id="{BB0EFA0C-2783-471D-8939-2BE70A2A34FC}" type="slidenum">
+              <a:rPr lang="en-GB" smtClean="0"/>
+              <a:t>2</a:t>
+            </a:fld>
+            <a:endParaRPr lang="en-GB"/>
+          </a:p>
+        </p:txBody>
+      </p:sp>
+    </p:spTree>
+    <p:extLst>
+      <p:ext uri="{BB962C8B-B14F-4D97-AF65-F5344CB8AC3E}">
+        <p14:creationId xmlns:p14="http://schemas.microsoft.com/office/powerpoint/2010/main" val="3328478914"/>
+      </p:ext>
+    </p:extLst>
+  </p:cSld>
+  <p:clrMapOvr>
+    <a:masterClrMapping/>
+  </p:clrMapOvr>
+</p:notes>
+</file>
+
+<file path=ppt/notesSlides/notesSlide2.xml><?xml version="1.0" encoding="utf-8"?>
+<p:notes xmlns:a="http://schemas.openxmlformats.org/drawingml/2006/main" xmlns:r="http://schemas.openxmlformats.org/officeDocument/2006/relationships" xmlns:p="http://schemas.openxmlformats.org/presentationml/2006/main">
+  <p:cSld>
+    <p:spTree>
+      <p:nvGrpSpPr>
+        <p:cNvPr id="1" name=""/>
+        <p:cNvGrpSpPr/>
+        <p:nvPr/>
+      </p:nvGrpSpPr>
+      <p:grpSpPr>
+        <a:xfrm>
+          <a:off x="0" y="0"/>
+          <a:ext cx="0" cy="0"/>
+          <a:chOff x="0" y="0"/>
+          <a:chExt cx="0" cy="0"/>
+        </a:xfrm>
+      </p:grpSpPr>
+      <p:sp>
+        <p:nvSpPr>
+          <p:cNvPr id="2" name="Slide Image Placeholder 1"/>
+          <p:cNvSpPr>
+            <a:spLocks noGrp="1" noRot="1" noChangeAspect="1"/>
+          </p:cNvSpPr>
+          <p:nvPr>
+            <p:ph type="sldImg"/>
+          </p:nvPr>
+        </p:nvSpPr>
+        <p:spPr/>
+      </p:sp>
+      <p:sp>
+        <p:nvSpPr>
+          <p:cNvPr id="3" name="Notes Placeholder 2"/>
+          <p:cNvSpPr>
+            <a:spLocks noGrp="1"/>
+          </p:cNvSpPr>
+          <p:nvPr>
+            <p:ph type="body" idx="1"/>
+          </p:nvPr>
+        </p:nvSpPr>
+        <p:spPr/>
+        <p:txBody>
+          <a:bodyPr/>
+          <a:lstStyle/>
+          <a:p>
+            <a:r>
+              <a:rPr lang="en-GB" dirty="0" err="1"/>
+              <a:t>Cuz</a:t>
+            </a:r>
+            <a:r>
+              <a:rPr lang="en-GB" dirty="0"/>
+              <a:t> I want to bring brotherhood in the modern world</a:t>
+            </a:r>
+          </a:p>
+          <a:p>
+            <a:r>
+              <a:rPr lang="en-GB" dirty="0"/>
+              <a:t>What is brotherhood?</a:t>
+            </a:r>
+          </a:p>
+          <a:p>
+            <a:r>
+              <a:rPr lang="en-GB" dirty="0"/>
+              <a:t>Adv/Disadv</a:t>
+            </a:r>
+          </a:p>
+          <a:p>
+            <a:r>
+              <a:rPr lang="en-GB" dirty="0"/>
+              <a:t>If </a:t>
+            </a:r>
+            <a:r>
+              <a:rPr lang="en-GB" dirty="0" err="1"/>
+              <a:t>brohood</a:t>
+            </a:r>
+            <a:r>
+              <a:rPr lang="en-GB" dirty="0"/>
+              <a:t> is </a:t>
+            </a:r>
+            <a:r>
+              <a:rPr lang="en-GB" dirty="0" err="1"/>
+              <a:t>soo</a:t>
+            </a:r>
+            <a:r>
+              <a:rPr lang="en-GB" dirty="0"/>
+              <a:t> good why is it lost In our society?</a:t>
+            </a:r>
+          </a:p>
+          <a:p>
+            <a:r>
+              <a:rPr lang="en-GB" dirty="0"/>
+              <a:t>How have others gone about solving this problem?</a:t>
+            </a:r>
+          </a:p>
+          <a:p>
+            <a:r>
+              <a:rPr lang="en-GB" dirty="0"/>
+              <a:t>Why building an app is one of the best ways to solve this issue?</a:t>
+            </a:r>
+          </a:p>
+          <a:p>
+            <a:endParaRPr lang="en-GB" dirty="0"/>
+          </a:p>
+        </p:txBody>
+      </p:sp>
+      <p:sp>
+        <p:nvSpPr>
+          <p:cNvPr id="4" name="Slide Number Placeholder 3"/>
+          <p:cNvSpPr>
+            <a:spLocks noGrp="1"/>
+          </p:cNvSpPr>
+          <p:nvPr>
+            <p:ph type="sldNum" sz="quarter" idx="5"/>
+          </p:nvPr>
+        </p:nvSpPr>
+        <p:spPr/>
+        <p:txBody>
+          <a:bodyPr/>
+          <a:lstStyle/>
+          <a:p>
+            <a:fld id="{BB0EFA0C-2783-471D-8939-2BE70A2A34FC}" type="slidenum">
+              <a:rPr lang="en-GB" smtClean="0"/>
+              <a:t>4</a:t>
+            </a:fld>
+            <a:endParaRPr lang="en-GB"/>
+          </a:p>
+        </p:txBody>
+      </p:sp>
+    </p:spTree>
+    <p:extLst>
+      <p:ext uri="{BB962C8B-B14F-4D97-AF65-F5344CB8AC3E}">
+        <p14:creationId xmlns:p14="http://schemas.microsoft.com/office/powerpoint/2010/main" val="3736471127"/>
+      </p:ext>
+    </p:extLst>
+  </p:cSld>
+  <p:clrMapOvr>
+    <a:masterClrMapping/>
+  </p:clrMapOvr>
+</p:notes>
+</file>
+
+<file path=ppt/notesSlides/notesSlide3.xml><?xml version="1.0" encoding="utf-8"?>
+<p:notes xmlns:a="http://schemas.openxmlformats.org/drawingml/2006/main" xmlns:r="http://schemas.openxmlformats.org/officeDocument/2006/relationships" xmlns:p="http://schemas.openxmlformats.org/presentationml/2006/main">
+  <p:cSld>
+    <p:spTree>
+      <p:nvGrpSpPr>
+        <p:cNvPr id="1" name=""/>
+        <p:cNvGrpSpPr/>
+        <p:nvPr/>
+      </p:nvGrpSpPr>
+      <p:grpSpPr>
+        <a:xfrm>
+          <a:off x="0" y="0"/>
+          <a:ext cx="0" cy="0"/>
+          <a:chOff x="0" y="0"/>
+          <a:chExt cx="0" cy="0"/>
+        </a:xfrm>
+      </p:grpSpPr>
+      <p:sp>
+        <p:nvSpPr>
+          <p:cNvPr id="2" name="Slide Image Placeholder 1"/>
+          <p:cNvSpPr>
+            <a:spLocks noGrp="1" noRot="1" noChangeAspect="1"/>
+          </p:cNvSpPr>
+          <p:nvPr>
+            <p:ph type="sldImg"/>
+          </p:nvPr>
+        </p:nvSpPr>
+        <p:spPr/>
+      </p:sp>
+      <p:sp>
+        <p:nvSpPr>
+          <p:cNvPr id="3" name="Notes Placeholder 2"/>
+          <p:cNvSpPr>
+            <a:spLocks noGrp="1"/>
+          </p:cNvSpPr>
+          <p:nvPr>
+            <p:ph type="body" idx="1"/>
+          </p:nvPr>
+        </p:nvSpPr>
+        <p:spPr/>
+        <p:txBody>
+          <a:bodyPr/>
+          <a:lstStyle/>
+          <a:p>
+            <a:endParaRPr lang="en-GB" dirty="0"/>
+          </a:p>
+        </p:txBody>
+      </p:sp>
+      <p:sp>
+        <p:nvSpPr>
+          <p:cNvPr id="4" name="Slide Number Placeholder 3"/>
+          <p:cNvSpPr>
+            <a:spLocks noGrp="1"/>
+          </p:cNvSpPr>
+          <p:nvPr>
+            <p:ph type="sldNum" sz="quarter" idx="5"/>
+          </p:nvPr>
+        </p:nvSpPr>
+        <p:spPr/>
+        <p:txBody>
+          <a:bodyPr/>
+          <a:lstStyle/>
+          <a:p>
+            <a:fld id="{BB0EFA0C-2783-471D-8939-2BE70A2A34FC}" type="slidenum">
+              <a:rPr lang="en-GB" smtClean="0"/>
+              <a:t>5</a:t>
+            </a:fld>
+            <a:endParaRPr lang="en-GB"/>
+          </a:p>
+        </p:txBody>
+      </p:sp>
+    </p:spTree>
+    <p:extLst>
+      <p:ext uri="{BB962C8B-B14F-4D97-AF65-F5344CB8AC3E}">
+        <p14:creationId xmlns:p14="http://schemas.microsoft.com/office/powerpoint/2010/main" val="943958683"/>
+      </p:ext>
+    </p:extLst>
+  </p:cSld>
+  <p:clrMapOvr>
+    <a:masterClrMapping/>
+  </p:clrMapOvr>
+</p:notes>
 </file>
 
 <file path=ppt/slideLayouts/slideLayout1.xml><?xml version="1.0" encoding="utf-8"?>
@@ -3460,7 +4143,7 @@
           <a:p>
             <a:r>
               <a:rPr lang="en-GB" dirty="0"/>
-              <a:t>What I would like to build?</a:t>
+              <a:t>End Of The Year Product</a:t>
             </a:r>
           </a:p>
         </p:txBody>
@@ -3488,7 +4171,13 @@
           <a:p>
             <a:r>
               <a:rPr lang="en-GB" dirty="0"/>
-              <a:t>Show what you are planning to build for the whole year</a:t>
+              <a:t>Web-app -&gt; Bro-App</a:t>
+            </a:r>
+          </a:p>
+          <a:p>
+            <a:r>
+              <a:rPr lang="en-GB" dirty="0"/>
+              <a:t>Technologies use: ReactJS + Firebase</a:t>
             </a:r>
           </a:p>
         </p:txBody>
@@ -3525,83 +4214,1251 @@
       </p:grpSpPr>
       <p:sp>
         <p:nvSpPr>
-          <p:cNvPr id="2" name="Title 1">
-            <a:extLst>
-              <a:ext uri="{FF2B5EF4-FFF2-40B4-BE49-F238E27FC236}">
-                <a16:creationId xmlns:a16="http://schemas.microsoft.com/office/drawing/2014/main" id="{D83C7985-6ABA-441A-9120-1D02C047D66A}"/>
-              </a:ext>
-            </a:extLst>
-          </p:cNvPr>
-          <p:cNvSpPr>
-            <a:spLocks noGrp="1"/>
-          </p:cNvSpPr>
-          <p:nvPr>
-            <p:ph type="title"/>
-          </p:nvPr>
-        </p:nvSpPr>
-        <p:spPr/>
-        <p:txBody>
-          <a:bodyPr/>
-          <a:lstStyle/>
-          <a:p>
-            <a:r>
-              <a:rPr lang="en-GB" dirty="0"/>
-              <a:t>Why you building bro-Online app?</a:t>
-            </a:r>
-          </a:p>
-        </p:txBody>
-      </p:sp>
-      <p:sp>
-        <p:nvSpPr>
-          <p:cNvPr id="3" name="Content Placeholder 2">
-            <a:extLst>
-              <a:ext uri="{FF2B5EF4-FFF2-40B4-BE49-F238E27FC236}">
-                <a16:creationId xmlns:a16="http://schemas.microsoft.com/office/drawing/2014/main" id="{6A7A0040-F0C5-4B2A-973E-2A7D1890C900}"/>
-              </a:ext>
-            </a:extLst>
-          </p:cNvPr>
-          <p:cNvSpPr>
-            <a:spLocks noGrp="1"/>
-          </p:cNvSpPr>
-          <p:nvPr>
-            <p:ph idx="1"/>
-          </p:nvPr>
-        </p:nvSpPr>
-        <p:spPr/>
-        <p:txBody>
-          <a:bodyPr/>
-          <a:lstStyle/>
-          <a:p>
-            <a:r>
-              <a:rPr lang="en-GB" dirty="0" err="1"/>
-              <a:t>Cuz</a:t>
-            </a:r>
-            <a:r>
-              <a:rPr lang="en-GB" dirty="0"/>
-              <a:t> I want to bring brotherhood in the modern world</a:t>
-            </a:r>
-          </a:p>
-          <a:p>
-            <a:r>
-              <a:rPr lang="en-GB" dirty="0"/>
-              <a:t>What is brotherhood?</a:t>
-            </a:r>
-          </a:p>
-          <a:p>
-            <a:r>
-              <a:rPr lang="en-GB" dirty="0"/>
-              <a:t>Adv/Disadv</a:t>
-            </a:r>
-          </a:p>
-          <a:p>
-            <a:endParaRPr lang="en-GB" dirty="0"/>
+          <p:cNvPr id="4" name="Rectangle 2">
+            <a:extLst>
+              <a:ext uri="{FF2B5EF4-FFF2-40B4-BE49-F238E27FC236}">
+                <a16:creationId xmlns:a16="http://schemas.microsoft.com/office/drawing/2014/main" id="{280F09ED-6B1F-4AB3-B7DB-16E49663A4AD}"/>
+              </a:ext>
+            </a:extLst>
+          </p:cNvPr>
+          <p:cNvSpPr>
+            <a:spLocks noChangeArrowheads="1"/>
+          </p:cNvSpPr>
+          <p:nvPr/>
+        </p:nvSpPr>
+        <p:spPr bwMode="auto">
+          <a:xfrm>
+            <a:off x="2610171" y="3224326"/>
+            <a:ext cx="1001486" cy="538609"/>
+          </a:xfrm>
+          <a:prstGeom prst="rect">
+            <a:avLst/>
+          </a:prstGeom>
+          <a:noFill/>
+          <a:ln>
+            <a:noFill/>
+          </a:ln>
+          <a:effectLst/>
+          <a:extLst>
+            <a:ext uri="{909E8E84-426E-40DD-AFC4-6F175D3DCCD1}">
+              <a14:hiddenFill xmlns:a14="http://schemas.microsoft.com/office/drawing/2010/main">
+                <a:solidFill>
+                  <a:schemeClr val="accent1"/>
+                </a:solidFill>
+              </a14:hiddenFill>
+            </a:ext>
+            <a:ext uri="{91240B29-F687-4F45-9708-019B960494DF}">
+              <a14:hiddenLine xmlns:a14="http://schemas.microsoft.com/office/drawing/2010/main" w="9525">
+                <a:solidFill>
+                  <a:schemeClr val="tx1"/>
+                </a:solidFill>
+                <a:miter lim="800000"/>
+                <a:headEnd/>
+                <a:tailEnd/>
+              </a14:hiddenLine>
+            </a:ext>
+            <a:ext uri="{AF507438-7753-43E0-B8FC-AC1667EBCBE1}">
+              <a14:hiddenEffects xmlns:a14="http://schemas.microsoft.com/office/drawing/2010/main">
+                <a:effectLst>
+                  <a:outerShdw dist="35921" dir="2700000" algn="ctr" rotWithShape="0">
+                    <a:schemeClr val="bg2"/>
+                  </a:outerShdw>
+                </a:effectLst>
+              </a14:hiddenEffects>
+            </a:ext>
+          </a:extLst>
+        </p:spPr>
+        <p:txBody>
+          <a:bodyPr vert="horz" wrap="square" lIns="91440" tIns="45720" rIns="91440" bIns="45720" numCol="1" anchor="ctr" anchorCtr="0" compatLnSpc="1">
+            <a:prstTxWarp prst="textNoShape">
+              <a:avLst/>
+            </a:prstTxWarp>
+            <a:spAutoFit/>
+          </a:bodyPr>
+          <a:lstStyle/>
+          <a:p>
+            <a:pPr marL="0" marR="0" lvl="0" indent="0" algn="l" defTabSz="914400" rtl="0" eaLnBrk="0" fontAlgn="base" latinLnBrk="0" hangingPunct="0">
+              <a:lnSpc>
+                <a:spcPct val="100000"/>
+              </a:lnSpc>
+              <a:spcBef>
+                <a:spcPct val="0"/>
+              </a:spcBef>
+              <a:spcAft>
+                <a:spcPct val="0"/>
+              </a:spcAft>
+              <a:buClrTx/>
+              <a:buSzTx/>
+              <a:buFontTx/>
+              <a:buNone/>
+              <a:tabLst/>
+            </a:pPr>
+            <a:r>
+              <a:rPr kumimoji="0" lang="en-GB" altLang="en-US" sz="1100" b="0" i="0" u="none" strike="noStrike" cap="none" normalizeH="0" baseline="0" dirty="0">
+                <a:ln>
+                  <a:noFill/>
+                </a:ln>
+                <a:solidFill>
+                  <a:schemeClr val="tx1"/>
+                </a:solidFill>
+                <a:effectLst/>
+                <a:latin typeface="Calibri" panose="020F0502020204030204" pitchFamily="34" charset="0"/>
+                <a:ea typeface="Calibri" panose="020F0502020204030204" pitchFamily="34" charset="0"/>
+                <a:cs typeface="Times New Roman" panose="02020603050405020304" pitchFamily="18" charset="0"/>
+              </a:rPr>
+              <a:t>Profile Page</a:t>
+            </a:r>
+            <a:endParaRPr kumimoji="0" lang="en-GB" altLang="en-US" sz="500" b="0" i="0" u="none" strike="noStrike" cap="none" normalizeH="0" baseline="0" dirty="0">
+              <a:ln>
+                <a:noFill/>
+              </a:ln>
+              <a:solidFill>
+                <a:schemeClr val="tx1"/>
+              </a:solidFill>
+              <a:effectLst/>
+            </a:endParaRPr>
+          </a:p>
+          <a:p>
+            <a:pPr marL="0" marR="0" lvl="0" indent="0" algn="l" defTabSz="914400" rtl="0" eaLnBrk="0" fontAlgn="base" latinLnBrk="0" hangingPunct="0">
+              <a:lnSpc>
+                <a:spcPct val="100000"/>
+              </a:lnSpc>
+              <a:spcBef>
+                <a:spcPct val="0"/>
+              </a:spcBef>
+              <a:spcAft>
+                <a:spcPct val="0"/>
+              </a:spcAft>
+              <a:buClrTx/>
+              <a:buSzTx/>
+              <a:buFontTx/>
+              <a:buNone/>
+              <a:tabLst/>
+            </a:pPr>
+            <a:endParaRPr kumimoji="0" lang="en-GB" altLang="en-US" sz="1800" b="0" i="0" u="none" strike="noStrike" cap="none" normalizeH="0" baseline="0" dirty="0">
+              <a:ln>
+                <a:noFill/>
+              </a:ln>
+              <a:solidFill>
+                <a:schemeClr val="tx1"/>
+              </a:solidFill>
+              <a:effectLst/>
+              <a:latin typeface="Arial" panose="020B0604020202020204" pitchFamily="34" charset="0"/>
+            </a:endParaRPr>
+          </a:p>
+        </p:txBody>
+      </p:sp>
+      <p:pic>
+        <p:nvPicPr>
+          <p:cNvPr id="1025" name="Picture 16">
+            <a:extLst>
+              <a:ext uri="{FF2B5EF4-FFF2-40B4-BE49-F238E27FC236}">
+                <a16:creationId xmlns:a16="http://schemas.microsoft.com/office/drawing/2014/main" id="{7CF1CB5E-9F49-4306-9C92-2FE7DFB1E0E4}"/>
+              </a:ext>
+            </a:extLst>
+          </p:cNvPr>
+          <p:cNvPicPr>
+            <a:picLocks noChangeAspect="1" noChangeArrowheads="1"/>
+          </p:cNvPicPr>
+          <p:nvPr/>
+        </p:nvPicPr>
+        <p:blipFill>
+          <a:blip r:embed="rId2">
+            <a:extLst>
+              <a:ext uri="{28A0092B-C50C-407E-A947-70E740481C1C}">
+                <a14:useLocalDpi xmlns:a14="http://schemas.microsoft.com/office/drawing/2010/main" val="0"/>
+              </a:ext>
+            </a:extLst>
+          </a:blip>
+          <a:srcRect/>
+          <a:stretch>
+            <a:fillRect/>
+          </a:stretch>
+        </p:blipFill>
+        <p:spPr bwMode="auto">
+          <a:xfrm>
+            <a:off x="1305646" y="3719837"/>
+            <a:ext cx="3610535" cy="2166321"/>
+          </a:xfrm>
+          <a:prstGeom prst="rect">
+            <a:avLst/>
+          </a:prstGeom>
+          <a:noFill/>
+          <a:extLst>
+            <a:ext uri="{909E8E84-426E-40DD-AFC4-6F175D3DCCD1}">
+              <a14:hiddenFill xmlns:a14="http://schemas.microsoft.com/office/drawing/2010/main">
+                <a:solidFill>
+                  <a:srgbClr val="FFFFFF"/>
+                </a:solidFill>
+              </a14:hiddenFill>
+            </a:ext>
+          </a:extLst>
+        </p:spPr>
+      </p:pic>
+      <p:sp>
+        <p:nvSpPr>
+          <p:cNvPr id="6" name="Rectangle 5">
+            <a:extLst>
+              <a:ext uri="{FF2B5EF4-FFF2-40B4-BE49-F238E27FC236}">
+                <a16:creationId xmlns:a16="http://schemas.microsoft.com/office/drawing/2014/main" id="{006AB6E3-B895-4AD6-AAD5-CD6813A3E8AB}"/>
+              </a:ext>
+            </a:extLst>
+          </p:cNvPr>
+          <p:cNvSpPr>
+            <a:spLocks noChangeArrowheads="1"/>
+          </p:cNvSpPr>
+          <p:nvPr/>
+        </p:nvSpPr>
+        <p:spPr bwMode="auto">
+          <a:xfrm>
+            <a:off x="1720233" y="359824"/>
+            <a:ext cx="889938" cy="261610"/>
+          </a:xfrm>
+          <a:prstGeom prst="rect">
+            <a:avLst/>
+          </a:prstGeom>
+          <a:noFill/>
+          <a:ln>
+            <a:noFill/>
+          </a:ln>
+          <a:effectLst/>
+          <a:extLst>
+            <a:ext uri="{909E8E84-426E-40DD-AFC4-6F175D3DCCD1}">
+              <a14:hiddenFill xmlns:a14="http://schemas.microsoft.com/office/drawing/2010/main">
+                <a:solidFill>
+                  <a:schemeClr val="accent1"/>
+                </a:solidFill>
+              </a14:hiddenFill>
+            </a:ext>
+            <a:ext uri="{91240B29-F687-4F45-9708-019B960494DF}">
+              <a14:hiddenLine xmlns:a14="http://schemas.microsoft.com/office/drawing/2010/main" w="9525">
+                <a:solidFill>
+                  <a:schemeClr val="tx1"/>
+                </a:solidFill>
+                <a:miter lim="800000"/>
+                <a:headEnd/>
+                <a:tailEnd/>
+              </a14:hiddenLine>
+            </a:ext>
+            <a:ext uri="{AF507438-7753-43E0-B8FC-AC1667EBCBE1}">
+              <a14:hiddenEffects xmlns:a14="http://schemas.microsoft.com/office/drawing/2010/main">
+                <a:effectLst>
+                  <a:outerShdw dist="35921" dir="2700000" algn="ctr" rotWithShape="0">
+                    <a:schemeClr val="bg2"/>
+                  </a:outerShdw>
+                </a:effectLst>
+              </a14:hiddenEffects>
+            </a:ext>
+          </a:extLst>
+        </p:spPr>
+        <p:txBody>
+          <a:bodyPr vert="horz" wrap="square" lIns="91440" tIns="45720" rIns="91440" bIns="45720" numCol="1" anchor="ctr" anchorCtr="0" compatLnSpc="1">
+            <a:prstTxWarp prst="textNoShape">
+              <a:avLst/>
+            </a:prstTxWarp>
+            <a:spAutoFit/>
+          </a:bodyPr>
+          <a:lstStyle/>
+          <a:p>
+            <a:pPr marL="0" marR="0" lvl="0" indent="0" algn="l" defTabSz="914400" rtl="0" eaLnBrk="0" fontAlgn="base" latinLnBrk="0" hangingPunct="0">
+              <a:lnSpc>
+                <a:spcPct val="100000"/>
+              </a:lnSpc>
+              <a:spcBef>
+                <a:spcPct val="0"/>
+              </a:spcBef>
+              <a:spcAft>
+                <a:spcPct val="0"/>
+              </a:spcAft>
+              <a:buClrTx/>
+              <a:buSzTx/>
+              <a:buFontTx/>
+              <a:buNone/>
+              <a:tabLst/>
+            </a:pPr>
+            <a:r>
+              <a:rPr kumimoji="0" lang="en-GB" altLang="en-US" sz="1100" b="0" i="0" u="none" strike="noStrike" cap="none" normalizeH="0" baseline="0" dirty="0">
+                <a:ln>
+                  <a:noFill/>
+                </a:ln>
+                <a:solidFill>
+                  <a:schemeClr val="tx1"/>
+                </a:solidFill>
+                <a:effectLst/>
+                <a:latin typeface="Calibri" panose="020F0502020204030204" pitchFamily="34" charset="0"/>
+                <a:ea typeface="Calibri" panose="020F0502020204030204" pitchFamily="34" charset="0"/>
+                <a:cs typeface="Times New Roman" panose="02020603050405020304" pitchFamily="18" charset="0"/>
+              </a:rPr>
+              <a:t>Home Page</a:t>
+            </a:r>
+            <a:endParaRPr kumimoji="0" lang="en-GB" altLang="en-US" sz="500" b="0" i="0" u="none" strike="noStrike" cap="none" normalizeH="0" baseline="0" dirty="0">
+              <a:ln>
+                <a:noFill/>
+              </a:ln>
+              <a:solidFill>
+                <a:schemeClr val="tx1"/>
+              </a:solidFill>
+              <a:effectLst/>
+            </a:endParaRPr>
+          </a:p>
+        </p:txBody>
+      </p:sp>
+      <p:pic>
+        <p:nvPicPr>
+          <p:cNvPr id="1028" name="Picture 17">
+            <a:extLst>
+              <a:ext uri="{FF2B5EF4-FFF2-40B4-BE49-F238E27FC236}">
+                <a16:creationId xmlns:a16="http://schemas.microsoft.com/office/drawing/2014/main" id="{DFEF708D-76F2-4A26-ABFE-8CEDE970A107}"/>
+              </a:ext>
+            </a:extLst>
+          </p:cNvPr>
+          <p:cNvPicPr>
+            <a:picLocks noChangeAspect="1" noChangeArrowheads="1"/>
+          </p:cNvPicPr>
+          <p:nvPr/>
+        </p:nvPicPr>
+        <p:blipFill>
+          <a:blip r:embed="rId3">
+            <a:extLst>
+              <a:ext uri="{28A0092B-C50C-407E-A947-70E740481C1C}">
+                <a14:useLocalDpi xmlns:a14="http://schemas.microsoft.com/office/drawing/2010/main" val="0"/>
+              </a:ext>
+            </a:extLst>
+          </a:blip>
+          <a:srcRect/>
+          <a:stretch>
+            <a:fillRect/>
+          </a:stretch>
+        </p:blipFill>
+        <p:spPr bwMode="auto">
+          <a:xfrm>
+            <a:off x="322197" y="692863"/>
+            <a:ext cx="3686011" cy="2160131"/>
+          </a:xfrm>
+          <a:prstGeom prst="rect">
+            <a:avLst/>
+          </a:prstGeom>
+          <a:noFill/>
+          <a:extLst>
+            <a:ext uri="{909E8E84-426E-40DD-AFC4-6F175D3DCCD1}">
+              <a14:hiddenFill xmlns:a14="http://schemas.microsoft.com/office/drawing/2010/main">
+                <a:solidFill>
+                  <a:srgbClr val="FFFFFF"/>
+                </a:solidFill>
+              </a14:hiddenFill>
+            </a:ext>
+          </a:extLst>
+        </p:spPr>
+      </p:pic>
+      <p:sp>
+        <p:nvSpPr>
+          <p:cNvPr id="7" name="Rectangle 6">
+            <a:extLst>
+              <a:ext uri="{FF2B5EF4-FFF2-40B4-BE49-F238E27FC236}">
+                <a16:creationId xmlns:a16="http://schemas.microsoft.com/office/drawing/2014/main" id="{49656294-A387-424D-9A37-95F041659ADC}"/>
+              </a:ext>
+            </a:extLst>
+          </p:cNvPr>
+          <p:cNvSpPr>
+            <a:spLocks noChangeArrowheads="1"/>
+          </p:cNvSpPr>
+          <p:nvPr/>
+        </p:nvSpPr>
+        <p:spPr bwMode="auto">
+          <a:xfrm flipV="1">
+            <a:off x="8863662" y="5886158"/>
+            <a:ext cx="7545773" cy="45719"/>
+          </a:xfrm>
+          <a:prstGeom prst="rect">
+            <a:avLst/>
+          </a:prstGeom>
+          <a:noFill/>
+          <a:ln>
+            <a:noFill/>
+          </a:ln>
+          <a:effectLst/>
+          <a:extLst>
+            <a:ext uri="{909E8E84-426E-40DD-AFC4-6F175D3DCCD1}">
+              <a14:hiddenFill xmlns:a14="http://schemas.microsoft.com/office/drawing/2010/main">
+                <a:solidFill>
+                  <a:schemeClr val="accent1"/>
+                </a:solidFill>
+              </a14:hiddenFill>
+            </a:ext>
+            <a:ext uri="{91240B29-F687-4F45-9708-019B960494DF}">
+              <a14:hiddenLine xmlns:a14="http://schemas.microsoft.com/office/drawing/2010/main" w="9525">
+                <a:solidFill>
+                  <a:schemeClr val="tx1"/>
+                </a:solidFill>
+                <a:miter lim="800000"/>
+                <a:headEnd/>
+                <a:tailEnd/>
+              </a14:hiddenLine>
+            </a:ext>
+            <a:ext uri="{AF507438-7753-43E0-B8FC-AC1667EBCBE1}">
+              <a14:hiddenEffects xmlns:a14="http://schemas.microsoft.com/office/drawing/2010/main">
+                <a:effectLst>
+                  <a:outerShdw dist="35921" dir="2700000" algn="ctr" rotWithShape="0">
+                    <a:schemeClr val="bg2"/>
+                  </a:outerShdw>
+                </a:effectLst>
+              </a14:hiddenEffects>
+            </a:ext>
+          </a:extLst>
+        </p:spPr>
+        <p:txBody>
+          <a:bodyPr vert="horz" wrap="square" lIns="91440" tIns="45720" rIns="91440" bIns="45720" numCol="1" anchor="ctr" anchorCtr="0" compatLnSpc="1">
+            <a:prstTxWarp prst="textNoShape">
+              <a:avLst/>
+            </a:prstTxWarp>
+            <a:spAutoFit/>
+          </a:bodyPr>
+          <a:lstStyle/>
+          <a:p>
+            <a:endParaRPr lang="en-GB"/>
+          </a:p>
+        </p:txBody>
+      </p:sp>
+      <p:sp>
+        <p:nvSpPr>
+          <p:cNvPr id="8" name="Rectangle 8">
+            <a:extLst>
+              <a:ext uri="{FF2B5EF4-FFF2-40B4-BE49-F238E27FC236}">
+                <a16:creationId xmlns:a16="http://schemas.microsoft.com/office/drawing/2014/main" id="{3A9A9234-9C0C-4675-A22C-A382FD2DC85F}"/>
+              </a:ext>
+            </a:extLst>
+          </p:cNvPr>
+          <p:cNvSpPr>
+            <a:spLocks noChangeArrowheads="1"/>
+          </p:cNvSpPr>
+          <p:nvPr/>
+        </p:nvSpPr>
+        <p:spPr bwMode="auto">
+          <a:xfrm>
+            <a:off x="5593692" y="449679"/>
+            <a:ext cx="1088572" cy="261610"/>
+          </a:xfrm>
+          <a:prstGeom prst="rect">
+            <a:avLst/>
+          </a:prstGeom>
+          <a:noFill/>
+          <a:ln>
+            <a:noFill/>
+          </a:ln>
+          <a:effectLst/>
+          <a:extLst>
+            <a:ext uri="{909E8E84-426E-40DD-AFC4-6F175D3DCCD1}">
+              <a14:hiddenFill xmlns:a14="http://schemas.microsoft.com/office/drawing/2010/main">
+                <a:solidFill>
+                  <a:schemeClr val="accent1"/>
+                </a:solidFill>
+              </a14:hiddenFill>
+            </a:ext>
+            <a:ext uri="{91240B29-F687-4F45-9708-019B960494DF}">
+              <a14:hiddenLine xmlns:a14="http://schemas.microsoft.com/office/drawing/2010/main" w="9525">
+                <a:solidFill>
+                  <a:schemeClr val="tx1"/>
+                </a:solidFill>
+                <a:miter lim="800000"/>
+                <a:headEnd/>
+                <a:tailEnd/>
+              </a14:hiddenLine>
+            </a:ext>
+            <a:ext uri="{AF507438-7753-43E0-B8FC-AC1667EBCBE1}">
+              <a14:hiddenEffects xmlns:a14="http://schemas.microsoft.com/office/drawing/2010/main">
+                <a:effectLst>
+                  <a:outerShdw dist="35921" dir="2700000" algn="ctr" rotWithShape="0">
+                    <a:schemeClr val="bg2"/>
+                  </a:outerShdw>
+                </a:effectLst>
+              </a14:hiddenEffects>
+            </a:ext>
+          </a:extLst>
+        </p:spPr>
+        <p:txBody>
+          <a:bodyPr vert="horz" wrap="square" lIns="91440" tIns="45720" rIns="91440" bIns="45720" numCol="1" anchor="ctr" anchorCtr="0" compatLnSpc="1">
+            <a:prstTxWarp prst="textNoShape">
+              <a:avLst/>
+            </a:prstTxWarp>
+            <a:spAutoFit/>
+          </a:bodyPr>
+          <a:lstStyle/>
+          <a:p>
+            <a:pPr marL="0" marR="0" lvl="0" indent="0" algn="l" defTabSz="914400" rtl="0" eaLnBrk="0" fontAlgn="base" latinLnBrk="0" hangingPunct="0">
+              <a:lnSpc>
+                <a:spcPct val="100000"/>
+              </a:lnSpc>
+              <a:spcBef>
+                <a:spcPct val="0"/>
+              </a:spcBef>
+              <a:spcAft>
+                <a:spcPct val="0"/>
+              </a:spcAft>
+              <a:buClrTx/>
+              <a:buSzTx/>
+              <a:buFontTx/>
+              <a:buNone/>
+              <a:tabLst/>
+            </a:pPr>
+            <a:r>
+              <a:rPr lang="en-GB" altLang="en-US" sz="1100" dirty="0">
+                <a:latin typeface="Calibri" panose="020F0502020204030204" pitchFamily="34" charset="0"/>
+                <a:ea typeface="Calibri" panose="020F0502020204030204" pitchFamily="34" charset="0"/>
+                <a:cs typeface="Times New Roman" panose="02020603050405020304" pitchFamily="18" charset="0"/>
+              </a:rPr>
+              <a:t>Tribe</a:t>
+            </a:r>
+            <a:r>
+              <a:rPr kumimoji="0" lang="en-GB" altLang="en-US" sz="1100" b="0" i="0" u="none" strike="noStrike" cap="none" normalizeH="0" baseline="0" dirty="0">
+                <a:ln>
+                  <a:noFill/>
+                </a:ln>
+                <a:solidFill>
+                  <a:schemeClr val="tx1"/>
+                </a:solidFill>
+                <a:effectLst/>
+                <a:latin typeface="Calibri" panose="020F0502020204030204" pitchFamily="34" charset="0"/>
+                <a:ea typeface="Calibri" panose="020F0502020204030204" pitchFamily="34" charset="0"/>
+                <a:cs typeface="Times New Roman" panose="02020603050405020304" pitchFamily="18" charset="0"/>
+              </a:rPr>
+              <a:t> Page</a:t>
+            </a:r>
+            <a:endParaRPr kumimoji="0" lang="en-GB" altLang="en-US" sz="500" b="0" i="0" u="none" strike="noStrike" cap="none" normalizeH="0" baseline="0" dirty="0">
+              <a:ln>
+                <a:noFill/>
+              </a:ln>
+              <a:solidFill>
+                <a:schemeClr val="tx1"/>
+              </a:solidFill>
+              <a:effectLst/>
+            </a:endParaRPr>
+          </a:p>
+        </p:txBody>
+      </p:sp>
+      <p:pic>
+        <p:nvPicPr>
+          <p:cNvPr id="1031" name="Picture 18">
+            <a:extLst>
+              <a:ext uri="{FF2B5EF4-FFF2-40B4-BE49-F238E27FC236}">
+                <a16:creationId xmlns:a16="http://schemas.microsoft.com/office/drawing/2014/main" id="{4A472988-6A3A-4D7E-9F96-851C3020E730}"/>
+              </a:ext>
+            </a:extLst>
+          </p:cNvPr>
+          <p:cNvPicPr>
+            <a:picLocks noChangeAspect="1" noChangeArrowheads="1"/>
+          </p:cNvPicPr>
+          <p:nvPr/>
+        </p:nvPicPr>
+        <p:blipFill>
+          <a:blip r:embed="rId4">
+            <a:extLst>
+              <a:ext uri="{28A0092B-C50C-407E-A947-70E740481C1C}">
+                <a14:useLocalDpi xmlns:a14="http://schemas.microsoft.com/office/drawing/2010/main" val="0"/>
+              </a:ext>
+            </a:extLst>
+          </a:blip>
+          <a:srcRect/>
+          <a:stretch>
+            <a:fillRect/>
+          </a:stretch>
+        </p:blipFill>
+        <p:spPr bwMode="auto">
+          <a:xfrm>
+            <a:off x="4520510" y="804125"/>
+            <a:ext cx="3067026" cy="1937606"/>
+          </a:xfrm>
+          <a:prstGeom prst="rect">
+            <a:avLst/>
+          </a:prstGeom>
+          <a:noFill/>
+          <a:extLst>
+            <a:ext uri="{909E8E84-426E-40DD-AFC4-6F175D3DCCD1}">
+              <a14:hiddenFill xmlns:a14="http://schemas.microsoft.com/office/drawing/2010/main">
+                <a:solidFill>
+                  <a:srgbClr val="FFFFFF"/>
+                </a:solidFill>
+              </a14:hiddenFill>
+            </a:ext>
+          </a:extLst>
+        </p:spPr>
+      </p:pic>
+      <p:sp>
+        <p:nvSpPr>
+          <p:cNvPr id="9" name="Rectangle 9">
+            <a:extLst>
+              <a:ext uri="{FF2B5EF4-FFF2-40B4-BE49-F238E27FC236}">
+                <a16:creationId xmlns:a16="http://schemas.microsoft.com/office/drawing/2014/main" id="{C9CFFBF7-3D41-44CA-A2A1-5941F0480042}"/>
+              </a:ext>
+            </a:extLst>
+          </p:cNvPr>
+          <p:cNvSpPr>
+            <a:spLocks noChangeArrowheads="1"/>
+          </p:cNvSpPr>
+          <p:nvPr/>
+        </p:nvSpPr>
+        <p:spPr bwMode="auto">
+          <a:xfrm>
+            <a:off x="6332375" y="7048500"/>
+            <a:ext cx="12192000" cy="0"/>
+          </a:xfrm>
+          <a:prstGeom prst="rect">
+            <a:avLst/>
+          </a:prstGeom>
+          <a:noFill/>
+          <a:ln>
+            <a:noFill/>
+          </a:ln>
+          <a:effectLst/>
+          <a:extLst>
+            <a:ext uri="{909E8E84-426E-40DD-AFC4-6F175D3DCCD1}">
+              <a14:hiddenFill xmlns:a14="http://schemas.microsoft.com/office/drawing/2010/main">
+                <a:solidFill>
+                  <a:schemeClr val="accent1"/>
+                </a:solidFill>
+              </a14:hiddenFill>
+            </a:ext>
+            <a:ext uri="{91240B29-F687-4F45-9708-019B960494DF}">
+              <a14:hiddenLine xmlns:a14="http://schemas.microsoft.com/office/drawing/2010/main" w="9525">
+                <a:solidFill>
+                  <a:schemeClr val="tx1"/>
+                </a:solidFill>
+                <a:miter lim="800000"/>
+                <a:headEnd/>
+                <a:tailEnd/>
+              </a14:hiddenLine>
+            </a:ext>
+            <a:ext uri="{AF507438-7753-43E0-B8FC-AC1667EBCBE1}">
+              <a14:hiddenEffects xmlns:a14="http://schemas.microsoft.com/office/drawing/2010/main">
+                <a:effectLst>
+                  <a:outerShdw dist="35921" dir="2700000" algn="ctr" rotWithShape="0">
+                    <a:schemeClr val="bg2"/>
+                  </a:outerShdw>
+                </a:effectLst>
+              </a14:hiddenEffects>
+            </a:ext>
+          </a:extLst>
+        </p:spPr>
+        <p:txBody>
+          <a:bodyPr vert="horz" wrap="none" lIns="91440" tIns="45720" rIns="91440" bIns="45720" numCol="1" anchor="ctr" anchorCtr="0" compatLnSpc="1">
+            <a:prstTxWarp prst="textNoShape">
+              <a:avLst/>
+            </a:prstTxWarp>
+            <a:spAutoFit/>
+          </a:bodyPr>
+          <a:lstStyle/>
+          <a:p>
+            <a:endParaRPr lang="en-GB"/>
+          </a:p>
+        </p:txBody>
+      </p:sp>
+      <p:pic>
+        <p:nvPicPr>
+          <p:cNvPr id="1035" name="Picture 22">
+            <a:extLst>
+              <a:ext uri="{FF2B5EF4-FFF2-40B4-BE49-F238E27FC236}">
+                <a16:creationId xmlns:a16="http://schemas.microsoft.com/office/drawing/2014/main" id="{5DECB353-FAA6-498F-B822-EC5A55EFA838}"/>
+              </a:ext>
+            </a:extLst>
+          </p:cNvPr>
+          <p:cNvPicPr>
+            <a:picLocks noChangeAspect="1" noChangeArrowheads="1"/>
+          </p:cNvPicPr>
+          <p:nvPr/>
+        </p:nvPicPr>
+        <p:blipFill>
+          <a:blip r:embed="rId5">
+            <a:extLst>
+              <a:ext uri="{28A0092B-C50C-407E-A947-70E740481C1C}">
+                <a14:useLocalDpi xmlns:a14="http://schemas.microsoft.com/office/drawing/2010/main" val="0"/>
+              </a:ext>
+            </a:extLst>
+          </a:blip>
+          <a:srcRect/>
+          <a:stretch>
+            <a:fillRect/>
+          </a:stretch>
+        </p:blipFill>
+        <p:spPr bwMode="auto">
+          <a:xfrm>
+            <a:off x="6406212" y="4850473"/>
+            <a:ext cx="4914900" cy="438150"/>
+          </a:xfrm>
+          <a:prstGeom prst="rect">
+            <a:avLst/>
+          </a:prstGeom>
+          <a:noFill/>
+          <a:extLst>
+            <a:ext uri="{909E8E84-426E-40DD-AFC4-6F175D3DCCD1}">
+              <a14:hiddenFill xmlns:a14="http://schemas.microsoft.com/office/drawing/2010/main">
+                <a:solidFill>
+                  <a:srgbClr val="FFFFFF"/>
+                </a:solidFill>
+              </a14:hiddenFill>
+            </a:ext>
+          </a:extLst>
+        </p:spPr>
+      </p:pic>
+      <p:pic>
+        <p:nvPicPr>
+          <p:cNvPr id="1034" name="Picture 21">
+            <a:extLst>
+              <a:ext uri="{FF2B5EF4-FFF2-40B4-BE49-F238E27FC236}">
+                <a16:creationId xmlns:a16="http://schemas.microsoft.com/office/drawing/2014/main" id="{0B5D52DD-CB83-4AA7-A529-9908DFE1D5F2}"/>
+              </a:ext>
+            </a:extLst>
+          </p:cNvPr>
+          <p:cNvPicPr>
+            <a:picLocks noChangeAspect="1" noChangeArrowheads="1"/>
+          </p:cNvPicPr>
+          <p:nvPr/>
+        </p:nvPicPr>
+        <p:blipFill>
+          <a:blip r:embed="rId6">
+            <a:extLst>
+              <a:ext uri="{28A0092B-C50C-407E-A947-70E740481C1C}">
+                <a14:useLocalDpi xmlns:a14="http://schemas.microsoft.com/office/drawing/2010/main" val="0"/>
+              </a:ext>
+            </a:extLst>
+          </a:blip>
+          <a:srcRect/>
+          <a:stretch>
+            <a:fillRect/>
+          </a:stretch>
+        </p:blipFill>
+        <p:spPr bwMode="auto">
+          <a:xfrm>
+            <a:off x="11321112" y="4850473"/>
+            <a:ext cx="314325" cy="438150"/>
+          </a:xfrm>
+          <a:prstGeom prst="rect">
+            <a:avLst/>
+          </a:prstGeom>
+          <a:noFill/>
+          <a:extLst>
+            <a:ext uri="{909E8E84-426E-40DD-AFC4-6F175D3DCCD1}">
+              <a14:hiddenFill xmlns:a14="http://schemas.microsoft.com/office/drawing/2010/main">
+                <a:solidFill>
+                  <a:srgbClr val="FFFFFF"/>
+                </a:solidFill>
+              </a14:hiddenFill>
+            </a:ext>
+          </a:extLst>
+        </p:spPr>
+      </p:pic>
+      <p:sp>
+        <p:nvSpPr>
+          <p:cNvPr id="10" name="Rectangle 12">
+            <a:extLst>
+              <a:ext uri="{FF2B5EF4-FFF2-40B4-BE49-F238E27FC236}">
+                <a16:creationId xmlns:a16="http://schemas.microsoft.com/office/drawing/2014/main" id="{F5C1E6AE-305A-46EC-B045-64B00F7672E2}"/>
+              </a:ext>
+            </a:extLst>
+          </p:cNvPr>
+          <p:cNvSpPr>
+            <a:spLocks noChangeArrowheads="1"/>
+          </p:cNvSpPr>
+          <p:nvPr/>
+        </p:nvSpPr>
+        <p:spPr bwMode="auto">
+          <a:xfrm>
+            <a:off x="8496658" y="4311864"/>
+            <a:ext cx="734008" cy="538609"/>
+          </a:xfrm>
+          <a:prstGeom prst="rect">
+            <a:avLst/>
+          </a:prstGeom>
+          <a:noFill/>
+          <a:ln>
+            <a:noFill/>
+          </a:ln>
+          <a:effectLst/>
+          <a:extLst>
+            <a:ext uri="{909E8E84-426E-40DD-AFC4-6F175D3DCCD1}">
+              <a14:hiddenFill xmlns:a14="http://schemas.microsoft.com/office/drawing/2010/main">
+                <a:solidFill>
+                  <a:schemeClr val="accent1"/>
+                </a:solidFill>
+              </a14:hiddenFill>
+            </a:ext>
+            <a:ext uri="{91240B29-F687-4F45-9708-019B960494DF}">
+              <a14:hiddenLine xmlns:a14="http://schemas.microsoft.com/office/drawing/2010/main" w="9525">
+                <a:solidFill>
+                  <a:schemeClr val="tx1"/>
+                </a:solidFill>
+                <a:miter lim="800000"/>
+                <a:headEnd/>
+                <a:tailEnd/>
+              </a14:hiddenLine>
+            </a:ext>
+            <a:ext uri="{AF507438-7753-43E0-B8FC-AC1667EBCBE1}">
+              <a14:hiddenEffects xmlns:a14="http://schemas.microsoft.com/office/drawing/2010/main">
+                <a:effectLst>
+                  <a:outerShdw dist="35921" dir="2700000" algn="ctr" rotWithShape="0">
+                    <a:schemeClr val="bg2"/>
+                  </a:outerShdw>
+                </a:effectLst>
+              </a14:hiddenEffects>
+            </a:ext>
+          </a:extLst>
+        </p:spPr>
+        <p:txBody>
+          <a:bodyPr vert="horz" wrap="square" lIns="91440" tIns="45720" rIns="91440" bIns="45720" numCol="1" anchor="ctr" anchorCtr="0" compatLnSpc="1">
+            <a:prstTxWarp prst="textNoShape">
+              <a:avLst/>
+            </a:prstTxWarp>
+            <a:spAutoFit/>
+          </a:bodyPr>
+          <a:lstStyle/>
+          <a:p>
+            <a:pPr marL="0" marR="0" lvl="0" indent="0" algn="l" defTabSz="914400" rtl="0" eaLnBrk="0" fontAlgn="base" latinLnBrk="0" hangingPunct="0">
+              <a:lnSpc>
+                <a:spcPct val="100000"/>
+              </a:lnSpc>
+              <a:spcBef>
+                <a:spcPct val="0"/>
+              </a:spcBef>
+              <a:spcAft>
+                <a:spcPct val="0"/>
+              </a:spcAft>
+              <a:buClrTx/>
+              <a:buSzTx/>
+              <a:buFontTx/>
+              <a:buNone/>
+              <a:tabLst/>
+            </a:pPr>
+            <a:r>
+              <a:rPr kumimoji="0" lang="en-GB" altLang="en-US" sz="1100" b="0" i="0" u="none" strike="noStrike" cap="none" normalizeH="0" baseline="0" dirty="0">
+                <a:ln>
+                  <a:noFill/>
+                </a:ln>
+                <a:solidFill>
+                  <a:schemeClr val="tx1"/>
+                </a:solidFill>
+                <a:effectLst/>
+                <a:latin typeface="Calibri" panose="020F0502020204030204" pitchFamily="34" charset="0"/>
+                <a:ea typeface="Calibri" panose="020F0502020204030204" pitchFamily="34" charset="0"/>
+                <a:cs typeface="Times New Roman" panose="02020603050405020304" pitchFamily="18" charset="0"/>
+              </a:rPr>
+              <a:t>Header</a:t>
+            </a:r>
+            <a:endParaRPr kumimoji="0" lang="en-GB" altLang="en-US" sz="500" b="0" i="0" u="none" strike="noStrike" cap="none" normalizeH="0" baseline="0" dirty="0">
+              <a:ln>
+                <a:noFill/>
+              </a:ln>
+              <a:solidFill>
+                <a:schemeClr val="tx1"/>
+              </a:solidFill>
+              <a:effectLst/>
+            </a:endParaRPr>
+          </a:p>
+          <a:p>
+            <a:pPr marL="0" marR="0" lvl="0" indent="0" algn="l" defTabSz="914400" rtl="0" eaLnBrk="0" fontAlgn="base" latinLnBrk="0" hangingPunct="0">
+              <a:lnSpc>
+                <a:spcPct val="100000"/>
+              </a:lnSpc>
+              <a:spcBef>
+                <a:spcPct val="0"/>
+              </a:spcBef>
+              <a:spcAft>
+                <a:spcPct val="0"/>
+              </a:spcAft>
+              <a:buClrTx/>
+              <a:buSzTx/>
+              <a:buFontTx/>
+              <a:buNone/>
+              <a:tabLst/>
+            </a:pPr>
+            <a:endParaRPr kumimoji="0" lang="en-GB" altLang="en-US" sz="1800" b="0" i="0" u="none" strike="noStrike" cap="none" normalizeH="0" baseline="0" dirty="0">
+              <a:ln>
+                <a:noFill/>
+              </a:ln>
+              <a:solidFill>
+                <a:schemeClr val="tx1"/>
+              </a:solidFill>
+              <a:effectLst/>
+              <a:latin typeface="Arial" panose="020B0604020202020204" pitchFamily="34" charset="0"/>
+            </a:endParaRPr>
+          </a:p>
+        </p:txBody>
+      </p:sp>
+      <p:sp>
+        <p:nvSpPr>
+          <p:cNvPr id="11" name="Rectangle 13">
+            <a:extLst>
+              <a:ext uri="{FF2B5EF4-FFF2-40B4-BE49-F238E27FC236}">
+                <a16:creationId xmlns:a16="http://schemas.microsoft.com/office/drawing/2014/main" id="{36E590D6-E636-42FD-AE68-FDEF837A4FAC}"/>
+              </a:ext>
+            </a:extLst>
+          </p:cNvPr>
+          <p:cNvSpPr>
+            <a:spLocks noChangeArrowheads="1"/>
+          </p:cNvSpPr>
+          <p:nvPr/>
+        </p:nvSpPr>
+        <p:spPr bwMode="auto">
+          <a:xfrm>
+            <a:off x="0" y="1333500"/>
+            <a:ext cx="12192000" cy="0"/>
+          </a:xfrm>
+          <a:prstGeom prst="rect">
+            <a:avLst/>
+          </a:prstGeom>
+          <a:noFill/>
+          <a:ln>
+            <a:noFill/>
+          </a:ln>
+          <a:effectLst/>
+          <a:extLst>
+            <a:ext uri="{909E8E84-426E-40DD-AFC4-6F175D3DCCD1}">
+              <a14:hiddenFill xmlns:a14="http://schemas.microsoft.com/office/drawing/2010/main">
+                <a:solidFill>
+                  <a:schemeClr val="accent1"/>
+                </a:solidFill>
+              </a14:hiddenFill>
+            </a:ext>
+            <a:ext uri="{91240B29-F687-4F45-9708-019B960494DF}">
+              <a14:hiddenLine xmlns:a14="http://schemas.microsoft.com/office/drawing/2010/main" w="9525">
+                <a:solidFill>
+                  <a:schemeClr val="tx1"/>
+                </a:solidFill>
+                <a:miter lim="800000"/>
+                <a:headEnd/>
+                <a:tailEnd/>
+              </a14:hiddenLine>
+            </a:ext>
+            <a:ext uri="{AF507438-7753-43E0-B8FC-AC1667EBCBE1}">
+              <a14:hiddenEffects xmlns:a14="http://schemas.microsoft.com/office/drawing/2010/main">
+                <a:effectLst>
+                  <a:outerShdw dist="35921" dir="2700000" algn="ctr" rotWithShape="0">
+                    <a:schemeClr val="bg2"/>
+                  </a:outerShdw>
+                </a:effectLst>
+              </a14:hiddenEffects>
+            </a:ext>
+          </a:extLst>
+        </p:spPr>
+        <p:txBody>
+          <a:bodyPr vert="horz" wrap="none" lIns="91440" tIns="45720" rIns="91440" bIns="45720" numCol="1" anchor="ctr" anchorCtr="0" compatLnSpc="1">
+            <a:prstTxWarp prst="textNoShape">
+              <a:avLst/>
+            </a:prstTxWarp>
+            <a:spAutoFit/>
+          </a:bodyPr>
+          <a:lstStyle/>
+          <a:p>
+            <a:pPr marL="0" marR="0" lvl="0" indent="0" algn="l" defTabSz="914400" rtl="0" eaLnBrk="0" fontAlgn="base" latinLnBrk="0" hangingPunct="0">
+              <a:lnSpc>
+                <a:spcPct val="100000"/>
+              </a:lnSpc>
+              <a:spcBef>
+                <a:spcPct val="0"/>
+              </a:spcBef>
+              <a:spcAft>
+                <a:spcPct val="0"/>
+              </a:spcAft>
+              <a:buClrTx/>
+              <a:buSzTx/>
+              <a:buFontTx/>
+              <a:buNone/>
+              <a:tabLst/>
+            </a:pPr>
+            <a:br>
+              <a:rPr kumimoji="0" lang="en-GB" altLang="en-US" sz="1100" b="0" i="0" u="none" strike="noStrike" cap="none" normalizeH="0" baseline="0">
+                <a:ln>
+                  <a:noFill/>
+                </a:ln>
+                <a:solidFill>
+                  <a:schemeClr val="tx1"/>
+                </a:solidFill>
+                <a:effectLst/>
+                <a:latin typeface="Calibri" panose="020F0502020204030204" pitchFamily="34" charset="0"/>
+                <a:ea typeface="Times New Roman" panose="02020603050405020304" pitchFamily="18" charset="0"/>
+                <a:cs typeface="Calibri" panose="020F0502020204030204" pitchFamily="34" charset="0"/>
+              </a:rPr>
+            </a:br>
+            <a:br>
+              <a:rPr kumimoji="0" lang="en-GB" altLang="en-US" sz="1100" b="0" i="0" u="none" strike="noStrike" cap="none" normalizeH="0" baseline="0">
+                <a:ln>
+                  <a:noFill/>
+                </a:ln>
+                <a:solidFill>
+                  <a:schemeClr val="tx1"/>
+                </a:solidFill>
+                <a:effectLst/>
+                <a:latin typeface="Calibri" panose="020F0502020204030204" pitchFamily="34" charset="0"/>
+                <a:ea typeface="Times New Roman" panose="02020603050405020304" pitchFamily="18" charset="0"/>
+                <a:cs typeface="Calibri" panose="020F0502020204030204" pitchFamily="34" charset="0"/>
+              </a:rPr>
+            </a:br>
+            <a:endParaRPr kumimoji="0" lang="en-GB" altLang="en-US" sz="1800" b="0" i="0" u="none" strike="noStrike" cap="none" normalizeH="0" baseline="0">
+              <a:ln>
+                <a:noFill/>
+              </a:ln>
+              <a:solidFill>
+                <a:schemeClr val="tx1"/>
+              </a:solidFill>
+              <a:effectLst/>
+              <a:latin typeface="Arial" panose="020B0604020202020204" pitchFamily="34" charset="0"/>
+            </a:endParaRPr>
+          </a:p>
+        </p:txBody>
+      </p:sp>
+      <p:sp>
+        <p:nvSpPr>
+          <p:cNvPr id="12" name="Rectangle 15">
+            <a:extLst>
+              <a:ext uri="{FF2B5EF4-FFF2-40B4-BE49-F238E27FC236}">
+                <a16:creationId xmlns:a16="http://schemas.microsoft.com/office/drawing/2014/main" id="{FE9D7737-4F5E-4B14-8F4B-C021457BE58A}"/>
+              </a:ext>
+            </a:extLst>
+          </p:cNvPr>
+          <p:cNvSpPr>
+            <a:spLocks noChangeArrowheads="1"/>
+          </p:cNvSpPr>
+          <p:nvPr/>
+        </p:nvSpPr>
+        <p:spPr bwMode="auto">
+          <a:xfrm>
+            <a:off x="9567900" y="374774"/>
+            <a:ext cx="930827" cy="538609"/>
+          </a:xfrm>
+          <a:prstGeom prst="rect">
+            <a:avLst/>
+          </a:prstGeom>
+          <a:noFill/>
+          <a:ln>
+            <a:noFill/>
+          </a:ln>
+          <a:effectLst/>
+          <a:extLst>
+            <a:ext uri="{909E8E84-426E-40DD-AFC4-6F175D3DCCD1}">
+              <a14:hiddenFill xmlns:a14="http://schemas.microsoft.com/office/drawing/2010/main">
+                <a:solidFill>
+                  <a:schemeClr val="accent1"/>
+                </a:solidFill>
+              </a14:hiddenFill>
+            </a:ext>
+            <a:ext uri="{91240B29-F687-4F45-9708-019B960494DF}">
+              <a14:hiddenLine xmlns:a14="http://schemas.microsoft.com/office/drawing/2010/main" w="9525">
+                <a:solidFill>
+                  <a:schemeClr val="tx1"/>
+                </a:solidFill>
+                <a:miter lim="800000"/>
+                <a:headEnd/>
+                <a:tailEnd/>
+              </a14:hiddenLine>
+            </a:ext>
+            <a:ext uri="{AF507438-7753-43E0-B8FC-AC1667EBCBE1}">
+              <a14:hiddenEffects xmlns:a14="http://schemas.microsoft.com/office/drawing/2010/main">
+                <a:effectLst>
+                  <a:outerShdw dist="35921" dir="2700000" algn="ctr" rotWithShape="0">
+                    <a:schemeClr val="bg2"/>
+                  </a:outerShdw>
+                </a:effectLst>
+              </a14:hiddenEffects>
+            </a:ext>
+          </a:extLst>
+        </p:spPr>
+        <p:txBody>
+          <a:bodyPr vert="horz" wrap="square" lIns="91440" tIns="45720" rIns="91440" bIns="45720" numCol="1" anchor="ctr" anchorCtr="0" compatLnSpc="1">
+            <a:prstTxWarp prst="textNoShape">
+              <a:avLst/>
+            </a:prstTxWarp>
+            <a:spAutoFit/>
+          </a:bodyPr>
+          <a:lstStyle/>
+          <a:p>
+            <a:pPr marL="0" marR="0" lvl="0" indent="0" algn="l" defTabSz="914400" rtl="0" eaLnBrk="0" fontAlgn="base" latinLnBrk="0" hangingPunct="0">
+              <a:lnSpc>
+                <a:spcPct val="100000"/>
+              </a:lnSpc>
+              <a:spcBef>
+                <a:spcPct val="0"/>
+              </a:spcBef>
+              <a:spcAft>
+                <a:spcPct val="0"/>
+              </a:spcAft>
+              <a:buClrTx/>
+              <a:buSzTx/>
+              <a:buFontTx/>
+              <a:buNone/>
+              <a:tabLst/>
+            </a:pPr>
+            <a:r>
+              <a:rPr kumimoji="0" lang="en-GB" altLang="en-US" sz="1100" b="0" i="0" u="none" strike="noStrike" cap="none" normalizeH="0" baseline="0" dirty="0">
+                <a:ln>
+                  <a:noFill/>
+                </a:ln>
+                <a:solidFill>
+                  <a:schemeClr val="tx1"/>
+                </a:solidFill>
+                <a:effectLst/>
+                <a:latin typeface="Calibri" panose="020F0502020204030204" pitchFamily="34" charset="0"/>
+                <a:ea typeface="Calibri" panose="020F0502020204030204" pitchFamily="34" charset="0"/>
+                <a:cs typeface="Times New Roman" panose="02020603050405020304" pitchFamily="18" charset="0"/>
+              </a:rPr>
+              <a:t>Search Page</a:t>
+            </a:r>
+            <a:endParaRPr kumimoji="0" lang="en-GB" altLang="en-US" sz="500" b="0" i="0" u="none" strike="noStrike" cap="none" normalizeH="0" baseline="0" dirty="0">
+              <a:ln>
+                <a:noFill/>
+              </a:ln>
+              <a:solidFill>
+                <a:schemeClr val="tx1"/>
+              </a:solidFill>
+              <a:effectLst/>
+            </a:endParaRPr>
+          </a:p>
+          <a:p>
+            <a:pPr marL="0" marR="0" lvl="0" indent="0" algn="l" defTabSz="914400" rtl="0" eaLnBrk="0" fontAlgn="base" latinLnBrk="0" hangingPunct="0">
+              <a:lnSpc>
+                <a:spcPct val="100000"/>
+              </a:lnSpc>
+              <a:spcBef>
+                <a:spcPct val="0"/>
+              </a:spcBef>
+              <a:spcAft>
+                <a:spcPct val="0"/>
+              </a:spcAft>
+              <a:buClrTx/>
+              <a:buSzTx/>
+              <a:buFontTx/>
+              <a:buNone/>
+              <a:tabLst/>
+            </a:pPr>
+            <a:endParaRPr kumimoji="0" lang="en-GB" altLang="en-US" sz="1800" b="0" i="0" u="none" strike="noStrike" cap="none" normalizeH="0" baseline="0" dirty="0">
+              <a:ln>
+                <a:noFill/>
+              </a:ln>
+              <a:solidFill>
+                <a:schemeClr val="tx1"/>
+              </a:solidFill>
+              <a:effectLst/>
+              <a:latin typeface="Arial" panose="020B0604020202020204" pitchFamily="34" charset="0"/>
+            </a:endParaRPr>
+          </a:p>
+        </p:txBody>
+      </p:sp>
+      <p:pic>
+        <p:nvPicPr>
+          <p:cNvPr id="1038" name="Picture 3">
+            <a:extLst>
+              <a:ext uri="{FF2B5EF4-FFF2-40B4-BE49-F238E27FC236}">
+                <a16:creationId xmlns:a16="http://schemas.microsoft.com/office/drawing/2014/main" id="{0F4F9F93-DDAB-4DEF-B41C-FEA7EDB19A0E}"/>
+              </a:ext>
+            </a:extLst>
+          </p:cNvPr>
+          <p:cNvPicPr>
+            <a:picLocks noChangeAspect="1" noChangeArrowheads="1"/>
+          </p:cNvPicPr>
+          <p:nvPr/>
+        </p:nvPicPr>
+        <p:blipFill>
+          <a:blip r:embed="rId7">
+            <a:extLst>
+              <a:ext uri="{28A0092B-C50C-407E-A947-70E740481C1C}">
+                <a14:useLocalDpi xmlns:a14="http://schemas.microsoft.com/office/drawing/2010/main" val="0"/>
+              </a:ext>
+            </a:extLst>
+          </a:blip>
+          <a:srcRect/>
+          <a:stretch>
+            <a:fillRect/>
+          </a:stretch>
+        </p:blipFill>
+        <p:spPr bwMode="auto">
+          <a:xfrm>
+            <a:off x="8281495" y="761878"/>
+            <a:ext cx="3503639" cy="2091116"/>
+          </a:xfrm>
+          <a:prstGeom prst="rect">
+            <a:avLst/>
+          </a:prstGeom>
+          <a:noFill/>
+          <a:extLst>
+            <a:ext uri="{909E8E84-426E-40DD-AFC4-6F175D3DCCD1}">
+              <a14:hiddenFill xmlns:a14="http://schemas.microsoft.com/office/drawing/2010/main">
+                <a:solidFill>
+                  <a:srgbClr val="FFFFFF"/>
+                </a:solidFill>
+              </a14:hiddenFill>
+            </a:ext>
+          </a:extLst>
+        </p:spPr>
+      </p:pic>
+      <p:sp>
+        <p:nvSpPr>
+          <p:cNvPr id="13" name="Rectangle 16">
+            <a:extLst>
+              <a:ext uri="{FF2B5EF4-FFF2-40B4-BE49-F238E27FC236}">
+                <a16:creationId xmlns:a16="http://schemas.microsoft.com/office/drawing/2014/main" id="{4904C342-48EA-4AFD-89FE-FDFB43392E4A}"/>
+              </a:ext>
+            </a:extLst>
+          </p:cNvPr>
+          <p:cNvSpPr>
+            <a:spLocks noChangeArrowheads="1"/>
+          </p:cNvSpPr>
+          <p:nvPr/>
+        </p:nvSpPr>
+        <p:spPr bwMode="auto">
+          <a:xfrm>
+            <a:off x="6137978" y="6601216"/>
+            <a:ext cx="12192000" cy="0"/>
+          </a:xfrm>
+          <a:prstGeom prst="rect">
+            <a:avLst/>
+          </a:prstGeom>
+          <a:noFill/>
+          <a:ln>
+            <a:noFill/>
+          </a:ln>
+          <a:effectLst/>
+          <a:extLst>
+            <a:ext uri="{909E8E84-426E-40DD-AFC4-6F175D3DCCD1}">
+              <a14:hiddenFill xmlns:a14="http://schemas.microsoft.com/office/drawing/2010/main">
+                <a:solidFill>
+                  <a:schemeClr val="accent1"/>
+                </a:solidFill>
+              </a14:hiddenFill>
+            </a:ext>
+            <a:ext uri="{91240B29-F687-4F45-9708-019B960494DF}">
+              <a14:hiddenLine xmlns:a14="http://schemas.microsoft.com/office/drawing/2010/main" w="9525">
+                <a:solidFill>
+                  <a:schemeClr val="tx1"/>
+                </a:solidFill>
+                <a:miter lim="800000"/>
+                <a:headEnd/>
+                <a:tailEnd/>
+              </a14:hiddenLine>
+            </a:ext>
+            <a:ext uri="{AF507438-7753-43E0-B8FC-AC1667EBCBE1}">
+              <a14:hiddenEffects xmlns:a14="http://schemas.microsoft.com/office/drawing/2010/main">
+                <a:effectLst>
+                  <a:outerShdw dist="35921" dir="2700000" algn="ctr" rotWithShape="0">
+                    <a:schemeClr val="bg2"/>
+                  </a:outerShdw>
+                </a:effectLst>
+              </a14:hiddenEffects>
+            </a:ext>
+          </a:extLst>
+        </p:spPr>
+        <p:txBody>
+          <a:bodyPr vert="horz" wrap="none" lIns="91440" tIns="45720" rIns="91440" bIns="45720" numCol="1" anchor="ctr" anchorCtr="0" compatLnSpc="1">
+            <a:prstTxWarp prst="textNoShape">
+              <a:avLst/>
+            </a:prstTxWarp>
+            <a:spAutoFit/>
+          </a:bodyPr>
+          <a:lstStyle/>
+          <a:p>
+            <a:endParaRPr lang="en-GB"/>
           </a:p>
         </p:txBody>
       </p:sp>
     </p:spTree>
     <p:extLst>
       <p:ext uri="{BB962C8B-B14F-4D97-AF65-F5344CB8AC3E}">
-        <p14:creationId xmlns:p14="http://schemas.microsoft.com/office/powerpoint/2010/main" val="2688071013"/>
+        <p14:creationId xmlns:p14="http://schemas.microsoft.com/office/powerpoint/2010/main" val="2214323535"/>
       </p:ext>
     </p:extLst>
   </p:cSld>
@@ -3633,6 +5490,281 @@
           <p:cNvPr id="2" name="Title 1">
             <a:extLst>
               <a:ext uri="{FF2B5EF4-FFF2-40B4-BE49-F238E27FC236}">
+                <a16:creationId xmlns:a16="http://schemas.microsoft.com/office/drawing/2014/main" id="{D83C7985-6ABA-441A-9120-1D02C047D66A}"/>
+              </a:ext>
+            </a:extLst>
+          </p:cNvPr>
+          <p:cNvSpPr>
+            <a:spLocks noGrp="1"/>
+          </p:cNvSpPr>
+          <p:nvPr>
+            <p:ph type="title"/>
+          </p:nvPr>
+        </p:nvSpPr>
+        <p:spPr/>
+        <p:txBody>
+          <a:bodyPr/>
+          <a:lstStyle/>
+          <a:p>
+            <a:r>
+              <a:rPr lang="en-GB" dirty="0"/>
+              <a:t>Why Bro-App?</a:t>
+            </a:r>
+          </a:p>
+        </p:txBody>
+      </p:sp>
+      <p:pic>
+        <p:nvPicPr>
+          <p:cNvPr id="2050" name="Picture 2">
+            <a:extLst>
+              <a:ext uri="{FF2B5EF4-FFF2-40B4-BE49-F238E27FC236}">
+                <a16:creationId xmlns:a16="http://schemas.microsoft.com/office/drawing/2014/main" id="{6F7CD84D-3F4D-40E9-BA8A-124D2BA9F255}"/>
+              </a:ext>
+            </a:extLst>
+          </p:cNvPr>
+          <p:cNvPicPr>
+            <a:picLocks noGrp="1" noChangeAspect="1" noChangeArrowheads="1"/>
+          </p:cNvPicPr>
+          <p:nvPr>
+            <p:ph idx="1"/>
+          </p:nvPr>
+        </p:nvPicPr>
+        <p:blipFill>
+          <a:blip r:embed="rId3">
+            <a:extLst>
+              <a:ext uri="{28A0092B-C50C-407E-A947-70E740481C1C}">
+                <a14:useLocalDpi xmlns:a14="http://schemas.microsoft.com/office/drawing/2010/main" val="0"/>
+              </a:ext>
+            </a:extLst>
+          </a:blip>
+          <a:srcRect/>
+          <a:stretch>
+            <a:fillRect/>
+          </a:stretch>
+        </p:blipFill>
+        <p:spPr bwMode="auto">
+          <a:xfrm>
+            <a:off x="938212" y="1990003"/>
+            <a:ext cx="6296206" cy="3537961"/>
+          </a:xfrm>
+          <a:prstGeom prst="rect">
+            <a:avLst/>
+          </a:prstGeom>
+          <a:noFill/>
+          <a:extLst>
+            <a:ext uri="{909E8E84-426E-40DD-AFC4-6F175D3DCCD1}">
+              <a14:hiddenFill xmlns:a14="http://schemas.microsoft.com/office/drawing/2010/main">
+                <a:solidFill>
+                  <a:srgbClr val="FFFFFF"/>
+                </a:solidFill>
+              </a14:hiddenFill>
+            </a:ext>
+          </a:extLst>
+        </p:spPr>
+      </p:pic>
+      <p:sp>
+        <p:nvSpPr>
+          <p:cNvPr id="5" name="TextBox 4">
+            <a:extLst>
+              <a:ext uri="{FF2B5EF4-FFF2-40B4-BE49-F238E27FC236}">
+                <a16:creationId xmlns:a16="http://schemas.microsoft.com/office/drawing/2014/main" id="{1673775F-1CB5-409D-BCDB-23A7D8C863F5}"/>
+              </a:ext>
+            </a:extLst>
+          </p:cNvPr>
+          <p:cNvSpPr txBox="1"/>
+          <p:nvPr/>
+        </p:nvSpPr>
+        <p:spPr>
+          <a:xfrm>
+            <a:off x="7703957" y="1990003"/>
+            <a:ext cx="3921986" cy="3139321"/>
+          </a:xfrm>
+          <a:prstGeom prst="rect">
+            <a:avLst/>
+          </a:prstGeom>
+          <a:noFill/>
+        </p:spPr>
+        <p:txBody>
+          <a:bodyPr wrap="square" rtlCol="0">
+            <a:spAutoFit/>
+          </a:bodyPr>
+          <a:lstStyle/>
+          <a:p>
+            <a:r>
+              <a:rPr lang="en-GB" dirty="0"/>
+              <a:t>Aim is to bring the brotherhood to our modern civil life. Why?</a:t>
+            </a:r>
+          </a:p>
+          <a:p>
+            <a:pPr marL="285750" indent="-285750">
+              <a:buFontTx/>
+              <a:buChar char="-"/>
+            </a:pPr>
+            <a:r>
+              <a:rPr lang="en-GB" dirty="0"/>
+              <a:t>Accelerate self-improvement via ‘proving each other that they deserve to be part of the team’ [6] (Background Research Section: Disadv of brotherhood)</a:t>
+            </a:r>
+          </a:p>
+          <a:p>
+            <a:pPr marL="285750" indent="-285750">
+              <a:buFontTx/>
+              <a:buChar char="-"/>
+            </a:pPr>
+            <a:r>
+              <a:rPr lang="en-GB" dirty="0"/>
+              <a:t>For well-being as claimed by [8] (Background Research Section: Adv of brotherhood)</a:t>
+            </a:r>
+          </a:p>
+          <a:p>
+            <a:pPr marL="285750" indent="-285750">
+              <a:buFontTx/>
+              <a:buChar char="-"/>
+            </a:pPr>
+            <a:endParaRPr lang="en-GB" dirty="0"/>
+          </a:p>
+        </p:txBody>
+      </p:sp>
+    </p:spTree>
+    <p:extLst>
+      <p:ext uri="{BB962C8B-B14F-4D97-AF65-F5344CB8AC3E}">
+        <p14:creationId xmlns:p14="http://schemas.microsoft.com/office/powerpoint/2010/main" val="2688071013"/>
+      </p:ext>
+    </p:extLst>
+  </p:cSld>
+  <p:clrMapOvr>
+    <a:masterClrMapping/>
+  </p:clrMapOvr>
+</p:sld>
+</file>
+
+<file path=ppt/slides/slide5.xml><?xml version="1.0" encoding="utf-8"?>
+<p:sld xmlns:a="http://schemas.openxmlformats.org/drawingml/2006/main" xmlns:r="http://schemas.openxmlformats.org/officeDocument/2006/relationships" xmlns:p="http://schemas.openxmlformats.org/presentationml/2006/main">
+  <p:cSld>
+    <p:spTree>
+      <p:nvGrpSpPr>
+        <p:cNvPr id="1" name=""/>
+        <p:cNvGrpSpPr/>
+        <p:nvPr/>
+      </p:nvGrpSpPr>
+      <p:grpSpPr>
+        <a:xfrm>
+          <a:off x="0" y="0"/>
+          <a:ext cx="0" cy="0"/>
+          <a:chOff x="0" y="0"/>
+          <a:chExt cx="0" cy="0"/>
+        </a:xfrm>
+      </p:grpSpPr>
+      <p:sp>
+        <p:nvSpPr>
+          <p:cNvPr id="3" name="Content Placeholder 2">
+            <a:extLst>
+              <a:ext uri="{FF2B5EF4-FFF2-40B4-BE49-F238E27FC236}">
+                <a16:creationId xmlns:a16="http://schemas.microsoft.com/office/drawing/2014/main" id="{CE367C91-F77F-4578-8FAC-5F00A41575D4}"/>
+              </a:ext>
+            </a:extLst>
+          </p:cNvPr>
+          <p:cNvSpPr>
+            <a:spLocks noGrp="1"/>
+          </p:cNvSpPr>
+          <p:nvPr>
+            <p:ph idx="1"/>
+          </p:nvPr>
+        </p:nvSpPr>
+        <p:spPr>
+          <a:xfrm>
+            <a:off x="838200" y="1020734"/>
+            <a:ext cx="10515600" cy="4351338"/>
+          </a:xfrm>
+        </p:spPr>
+        <p:txBody>
+          <a:bodyPr/>
+          <a:lstStyle/>
+          <a:p>
+            <a:r>
+              <a:rPr lang="en-GB" dirty="0"/>
+              <a:t>If brotherhood is so great why is it lost now?</a:t>
+            </a:r>
+          </a:p>
+          <a:p>
+            <a:r>
+              <a:rPr lang="en-GB" dirty="0"/>
+              <a:t>How have others gone about solving the lack of brotherhood in our society?</a:t>
+            </a:r>
+          </a:p>
+          <a:p>
+            <a:r>
+              <a:rPr lang="en-GB" dirty="0"/>
+              <a:t>Why building the app is one of the best way to solve it?</a:t>
+            </a:r>
+          </a:p>
+          <a:p>
+            <a:pPr lvl="1"/>
+            <a:r>
+              <a:rPr lang="en-GB" dirty="0"/>
+              <a:t>Finding the group/creating it is the hardest part</a:t>
+            </a:r>
+          </a:p>
+          <a:p>
+            <a:pPr lvl="1"/>
+            <a:r>
+              <a:rPr lang="en-GB" dirty="0"/>
+              <a:t>Takes long to find like-minded people</a:t>
+            </a:r>
+          </a:p>
+          <a:p>
+            <a:pPr lvl="1"/>
+            <a:r>
+              <a:rPr lang="en-GB" dirty="0"/>
+              <a:t>‘Conscious deliberate effort’</a:t>
+            </a:r>
+          </a:p>
+          <a:p>
+            <a:pPr lvl="1"/>
+            <a:r>
+              <a:rPr lang="en-GB" dirty="0"/>
+              <a:t>Acts as an advert/promotion</a:t>
+            </a:r>
+          </a:p>
+          <a:p>
+            <a:endParaRPr lang="en-GB" dirty="0"/>
+          </a:p>
+        </p:txBody>
+      </p:sp>
+    </p:spTree>
+    <p:extLst>
+      <p:ext uri="{BB962C8B-B14F-4D97-AF65-F5344CB8AC3E}">
+        <p14:creationId xmlns:p14="http://schemas.microsoft.com/office/powerpoint/2010/main" val="1475443335"/>
+      </p:ext>
+    </p:extLst>
+  </p:cSld>
+  <p:clrMapOvr>
+    <a:masterClrMapping/>
+  </p:clrMapOvr>
+</p:sld>
+</file>
+
+<file path=ppt/slides/slide6.xml><?xml version="1.0" encoding="utf-8"?>
+<p:sld xmlns:a="http://schemas.openxmlformats.org/drawingml/2006/main" xmlns:r="http://schemas.openxmlformats.org/officeDocument/2006/relationships" xmlns:p="http://schemas.openxmlformats.org/presentationml/2006/main">
+  <p:cSld>
+    <p:spTree>
+      <p:nvGrpSpPr>
+        <p:cNvPr id="1" name=""/>
+        <p:cNvGrpSpPr/>
+        <p:nvPr/>
+      </p:nvGrpSpPr>
+      <p:grpSpPr>
+        <a:xfrm>
+          <a:off x="0" y="0"/>
+          <a:ext cx="0" cy="0"/>
+          <a:chOff x="0" y="0"/>
+          <a:chExt cx="0" cy="0"/>
+        </a:xfrm>
+      </p:grpSpPr>
+      <p:sp>
+        <p:nvSpPr>
+          <p:cNvPr id="2" name="Title 1">
+            <a:extLst>
+              <a:ext uri="{FF2B5EF4-FFF2-40B4-BE49-F238E27FC236}">
                 <a16:creationId xmlns:a16="http://schemas.microsoft.com/office/drawing/2014/main" id="{566AFC4D-A5B3-4CD2-A9C3-C69BE64D1655}"/>
               </a:ext>
             </a:extLst>
@@ -3651,7 +5783,7 @@
           <a:p>
             <a:r>
               <a:rPr lang="en-GB" dirty="0"/>
-              <a:t>Project Plan</a:t>
+              <a:t>MVP target</a:t>
             </a:r>
           </a:p>
         </p:txBody>
@@ -3677,7 +5809,10 @@
           <a:bodyPr/>
           <a:lstStyle/>
           <a:p>
-            <a:endParaRPr lang="en-GB"/>
+            <a:r>
+              <a:rPr lang="en-GB" dirty="0"/>
+              <a:t>Focus on getting the logic done</a:t>
+            </a:r>
           </a:p>
         </p:txBody>
       </p:sp>
@@ -3694,7 +5829,7 @@
 </p:sld>
 </file>
 
-<file path=ppt/slides/slide5.xml><?xml version="1.0" encoding="utf-8"?>
+<file path=ppt/slides/slide7.xml><?xml version="1.0" encoding="utf-8"?>
 <p:sld xmlns:a="http://schemas.openxmlformats.org/drawingml/2006/main" xmlns:r="http://schemas.openxmlformats.org/officeDocument/2006/relationships" xmlns:p="http://schemas.openxmlformats.org/presentationml/2006/main">
   <p:cSld>
     <p:spTree>
@@ -4070,4 +6205,299 @@
     </a:ext>
   </a:extLst>
 </a:theme>
+</file>
+
+<file path=ppt/theme/theme2.xml><?xml version="1.0" encoding="utf-8"?>
+<a:theme xmlns:a="http://schemas.openxmlformats.org/drawingml/2006/main" name="Office Theme">
+  <a:themeElements>
+    <a:clrScheme name="Office">
+      <a:dk1>
+        <a:sysClr val="windowText" lastClr="000000"/>
+      </a:dk1>
+      <a:lt1>
+        <a:sysClr val="window" lastClr="FFFFFF"/>
+      </a:lt1>
+      <a:dk2>
+        <a:srgbClr val="44546A"/>
+      </a:dk2>
+      <a:lt2>
+        <a:srgbClr val="E7E6E6"/>
+      </a:lt2>
+      <a:accent1>
+        <a:srgbClr val="4472C4"/>
+      </a:accent1>
+      <a:accent2>
+        <a:srgbClr val="ED7D31"/>
+      </a:accent2>
+      <a:accent3>
+        <a:srgbClr val="A5A5A5"/>
+      </a:accent3>
+      <a:accent4>
+        <a:srgbClr val="FFC000"/>
+      </a:accent4>
+      <a:accent5>
+        <a:srgbClr val="5B9BD5"/>
+      </a:accent5>
+      <a:accent6>
+        <a:srgbClr val="70AD47"/>
+      </a:accent6>
+      <a:hlink>
+        <a:srgbClr val="0563C1"/>
+      </a:hlink>
+      <a:folHlink>
+        <a:srgbClr val="954F72"/>
+      </a:folHlink>
+    </a:clrScheme>
+    <a:fontScheme name="Office">
+      <a:majorFont>
+        <a:latin typeface="Calibri Light" panose="020F0302020204030204"/>
+        <a:ea typeface=""/>
+        <a:cs typeface=""/>
+        <a:font script="Jpan" typeface="游ゴシック Light"/>
+        <a:font script="Hang" typeface="맑은 고딕"/>
+        <a:font script="Hans" typeface="等线 Light"/>
+        <a:font script="Hant" typeface="新細明體"/>
+        <a:font script="Arab" typeface="Times New Roman"/>
+        <a:font script="Hebr" typeface="Times New Roman"/>
+        <a:font script="Thai" typeface="Angsana New"/>
+        <a:font script="Ethi" typeface="Nyala"/>
+        <a:font script="Beng" typeface="Vrinda"/>
+        <a:font script="Gujr" typeface="Shruti"/>
+        <a:font script="Khmr" typeface="MoolBoran"/>
+        <a:font script="Knda" typeface="Tunga"/>
+        <a:font script="Guru" typeface="Raavi"/>
+        <a:font script="Cans" typeface="Euphemia"/>
+        <a:font script="Cher" typeface="Plantagenet Cherokee"/>
+        <a:font script="Yiii" typeface="Microsoft Yi Baiti"/>
+        <a:font script="Tibt" typeface="Microsoft Himalaya"/>
+        <a:font script="Thaa" typeface="MV Boli"/>
+        <a:font script="Deva" typeface="Mangal"/>
+        <a:font script="Telu" typeface="Gautami"/>
+        <a:font script="Taml" typeface="Latha"/>
+        <a:font script="Syrc" typeface="Estrangelo Edessa"/>
+        <a:font script="Orya" typeface="Kalinga"/>
+        <a:font script="Mlym" typeface="Kartika"/>
+        <a:font script="Laoo" typeface="DokChampa"/>
+        <a:font script="Sinh" typeface="Iskoola Pota"/>
+        <a:font script="Mong" typeface="Mongolian Baiti"/>
+        <a:font script="Viet" typeface="Times New Roman"/>
+        <a:font script="Uigh" typeface="Microsoft Uighur"/>
+        <a:font script="Geor" typeface="Sylfaen"/>
+        <a:font script="Armn" typeface="Arial"/>
+        <a:font script="Bugi" typeface="Leelawadee UI"/>
+        <a:font script="Bopo" typeface="Microsoft JhengHei"/>
+        <a:font script="Java" typeface="Javanese Text"/>
+        <a:font script="Lisu" typeface="Segoe UI"/>
+        <a:font script="Mymr" typeface="Myanmar Text"/>
+        <a:font script="Nkoo" typeface="Ebrima"/>
+        <a:font script="Olck" typeface="Nirmala UI"/>
+        <a:font script="Osma" typeface="Ebrima"/>
+        <a:font script="Phag" typeface="Phagspa"/>
+        <a:font script="Syrn" typeface="Estrangelo Edessa"/>
+        <a:font script="Syrj" typeface="Estrangelo Edessa"/>
+        <a:font script="Syre" typeface="Estrangelo Edessa"/>
+        <a:font script="Sora" typeface="Nirmala UI"/>
+        <a:font script="Tale" typeface="Microsoft Tai Le"/>
+        <a:font script="Talu" typeface="Microsoft New Tai Lue"/>
+        <a:font script="Tfng" typeface="Ebrima"/>
+      </a:majorFont>
+      <a:minorFont>
+        <a:latin typeface="Calibri" panose="020F0502020204030204"/>
+        <a:ea typeface=""/>
+        <a:cs typeface=""/>
+        <a:font script="Jpan" typeface="游ゴシック"/>
+        <a:font script="Hang" typeface="맑은 고딕"/>
+        <a:font script="Hans" typeface="等线"/>
+        <a:font script="Hant" typeface="新細明體"/>
+        <a:font script="Arab" typeface="Arial"/>
+        <a:font script="Hebr" typeface="Arial"/>
+        <a:font script="Thai" typeface="Cordia New"/>
+        <a:font script="Ethi" typeface="Nyala"/>
+        <a:font script="Beng" typeface="Vrinda"/>
+        <a:font script="Gujr" typeface="Shruti"/>
+        <a:font script="Khmr" typeface="DaunPenh"/>
+        <a:font script="Knda" typeface="Tunga"/>
+        <a:font script="Guru" typeface="Raavi"/>
+        <a:font script="Cans" typeface="Euphemia"/>
+        <a:font script="Cher" typeface="Plantagenet Cherokee"/>
+        <a:font script="Yiii" typeface="Microsoft Yi Baiti"/>
+        <a:font script="Tibt" typeface="Microsoft Himalaya"/>
+        <a:font script="Thaa" typeface="MV Boli"/>
+        <a:font script="Deva" typeface="Mangal"/>
+        <a:font script="Telu" typeface="Gautami"/>
+        <a:font script="Taml" typeface="Latha"/>
+        <a:font script="Syrc" typeface="Estrangelo Edessa"/>
+        <a:font script="Orya" typeface="Kalinga"/>
+        <a:font script="Mlym" typeface="Kartika"/>
+        <a:font script="Laoo" typeface="DokChampa"/>
+        <a:font script="Sinh" typeface="Iskoola Pota"/>
+        <a:font script="Mong" typeface="Mongolian Baiti"/>
+        <a:font script="Viet" typeface="Arial"/>
+        <a:font script="Uigh" typeface="Microsoft Uighur"/>
+        <a:font script="Geor" typeface="Sylfaen"/>
+        <a:font script="Armn" typeface="Arial"/>
+        <a:font script="Bugi" typeface="Leelawadee UI"/>
+        <a:font script="Bopo" typeface="Microsoft JhengHei"/>
+        <a:font script="Java" typeface="Javanese Text"/>
+        <a:font script="Lisu" typeface="Segoe UI"/>
+        <a:font script="Mymr" typeface="Myanmar Text"/>
+        <a:font script="Nkoo" typeface="Ebrima"/>
+        <a:font script="Olck" typeface="Nirmala UI"/>
+        <a:font script="Osma" typeface="Ebrima"/>
+        <a:font script="Phag" typeface="Phagspa"/>
+        <a:font script="Syrn" typeface="Estrangelo Edessa"/>
+        <a:font script="Syrj" typeface="Estrangelo Edessa"/>
+        <a:font script="Syre" typeface="Estrangelo Edessa"/>
+        <a:font script="Sora" typeface="Nirmala UI"/>
+        <a:font script="Tale" typeface="Microsoft Tai Le"/>
+        <a:font script="Talu" typeface="Microsoft New Tai Lue"/>
+        <a:font script="Tfng" typeface="Ebrima"/>
+      </a:minorFont>
+    </a:fontScheme>
+    <a:fmtScheme name="Office">
+      <a:fillStyleLst>
+        <a:solidFill>
+          <a:schemeClr val="phClr"/>
+        </a:solidFill>
+        <a:gradFill rotWithShape="1">
+          <a:gsLst>
+            <a:gs pos="0">
+              <a:schemeClr val="phClr">
+                <a:lumMod val="110000"/>
+                <a:satMod val="105000"/>
+                <a:tint val="67000"/>
+              </a:schemeClr>
+            </a:gs>
+            <a:gs pos="50000">
+              <a:schemeClr val="phClr">
+                <a:lumMod val="105000"/>
+                <a:satMod val="103000"/>
+                <a:tint val="73000"/>
+              </a:schemeClr>
+            </a:gs>
+            <a:gs pos="100000">
+              <a:schemeClr val="phClr">
+                <a:lumMod val="105000"/>
+                <a:satMod val="109000"/>
+                <a:tint val="81000"/>
+              </a:schemeClr>
+            </a:gs>
+          </a:gsLst>
+          <a:lin ang="5400000" scaled="0"/>
+        </a:gradFill>
+        <a:gradFill rotWithShape="1">
+          <a:gsLst>
+            <a:gs pos="0">
+              <a:schemeClr val="phClr">
+                <a:satMod val="103000"/>
+                <a:lumMod val="102000"/>
+                <a:tint val="94000"/>
+              </a:schemeClr>
+            </a:gs>
+            <a:gs pos="50000">
+              <a:schemeClr val="phClr">
+                <a:satMod val="110000"/>
+                <a:lumMod val="100000"/>
+                <a:shade val="100000"/>
+              </a:schemeClr>
+            </a:gs>
+            <a:gs pos="100000">
+              <a:schemeClr val="phClr">
+                <a:lumMod val="99000"/>
+                <a:satMod val="120000"/>
+                <a:shade val="78000"/>
+              </a:schemeClr>
+            </a:gs>
+          </a:gsLst>
+          <a:lin ang="5400000" scaled="0"/>
+        </a:gradFill>
+      </a:fillStyleLst>
+      <a:lnStyleLst>
+        <a:ln w="6350" cap="flat" cmpd="sng" algn="ctr">
+          <a:solidFill>
+            <a:schemeClr val="phClr"/>
+          </a:solidFill>
+          <a:prstDash val="solid"/>
+          <a:miter lim="800000"/>
+        </a:ln>
+        <a:ln w="12700" cap="flat" cmpd="sng" algn="ctr">
+          <a:solidFill>
+            <a:schemeClr val="phClr"/>
+          </a:solidFill>
+          <a:prstDash val="solid"/>
+          <a:miter lim="800000"/>
+        </a:ln>
+        <a:ln w="19050" cap="flat" cmpd="sng" algn="ctr">
+          <a:solidFill>
+            <a:schemeClr val="phClr"/>
+          </a:solidFill>
+          <a:prstDash val="solid"/>
+          <a:miter lim="800000"/>
+        </a:ln>
+      </a:lnStyleLst>
+      <a:effectStyleLst>
+        <a:effectStyle>
+          <a:effectLst/>
+        </a:effectStyle>
+        <a:effectStyle>
+          <a:effectLst/>
+        </a:effectStyle>
+        <a:effectStyle>
+          <a:effectLst>
+            <a:outerShdw blurRad="57150" dist="19050" dir="5400000" algn="ctr" rotWithShape="0">
+              <a:srgbClr val="000000">
+                <a:alpha val="63000"/>
+              </a:srgbClr>
+            </a:outerShdw>
+          </a:effectLst>
+        </a:effectStyle>
+      </a:effectStyleLst>
+      <a:bgFillStyleLst>
+        <a:solidFill>
+          <a:schemeClr val="phClr"/>
+        </a:solidFill>
+        <a:solidFill>
+          <a:schemeClr val="phClr">
+            <a:tint val="95000"/>
+            <a:satMod val="170000"/>
+          </a:schemeClr>
+        </a:solidFill>
+        <a:gradFill rotWithShape="1">
+          <a:gsLst>
+            <a:gs pos="0">
+              <a:schemeClr val="phClr">
+                <a:tint val="93000"/>
+                <a:satMod val="150000"/>
+                <a:shade val="98000"/>
+                <a:lumMod val="102000"/>
+              </a:schemeClr>
+            </a:gs>
+            <a:gs pos="50000">
+              <a:schemeClr val="phClr">
+                <a:tint val="98000"/>
+                <a:satMod val="130000"/>
+                <a:shade val="90000"/>
+                <a:lumMod val="103000"/>
+              </a:schemeClr>
+            </a:gs>
+            <a:gs pos="100000">
+              <a:schemeClr val="phClr">
+                <a:shade val="63000"/>
+                <a:satMod val="120000"/>
+              </a:schemeClr>
+            </a:gs>
+          </a:gsLst>
+          <a:lin ang="5400000" scaled="0"/>
+        </a:gradFill>
+      </a:bgFillStyleLst>
+    </a:fmtScheme>
+  </a:themeElements>
+  <a:objectDefaults/>
+  <a:extraClrSchemeLst/>
+  <a:extLst>
+    <a:ext uri="{05A4C25C-085E-4340-85A3-A5531E510DB2}">
+      <thm15:themeFamily xmlns:thm15="http://schemas.microsoft.com/office/thememl/2012/main" name="Office Theme" id="{62F939B6-93AF-4DB8-9C6B-D6C7DFDC589F}" vid="{4A3C46E8-61CC-4603-A589-7422A47A8E4A}"/>
+    </a:ext>
+  </a:extLst>
+</a:theme>
 </file>
</xml_diff>

<commit_message>
Social media tutorial; Time on Youtube '1:48:47'
</commit_message>
<xml_diff>
--- a/Challenge Week/Challenge Week Presentation.pptx
+++ b/Challenge Week/Challenge Week Presentation.pptx
@@ -5,7 +5,7 @@
     <p:sldMasterId id="2147483678" r:id="rId1"/>
   </p:sldMasterIdLst>
   <p:notesMasterIdLst>
-    <p:notesMasterId r:id="rId9"/>
+    <p:notesMasterId r:id="rId11"/>
   </p:notesMasterIdLst>
   <p:sldIdLst>
     <p:sldId id="256" r:id="rId2"/>
@@ -15,6 +15,8 @@
     <p:sldId id="262" r:id="rId6"/>
     <p:sldId id="258" r:id="rId7"/>
     <p:sldId id="259" r:id="rId8"/>
+    <p:sldId id="263" r:id="rId9"/>
+    <p:sldId id="264" r:id="rId10"/>
   </p:sldIdLst>
   <p:sldSz cx="12192000" cy="6858000"/>
   <p:notesSz cx="6858000" cy="9144000"/>
@@ -203,7 +205,7 @@
           <a:p>
             <a:fld id="{6BAAA785-8E43-4A20-A0C3-B189128ACA38}" type="datetimeFigureOut">
               <a:rPr lang="en-GB" smtClean="0"/>
-              <a:t>13/10/2020</a:t>
+              <a:t>15/10/2020</a:t>
             </a:fld>
             <a:endParaRPr lang="en-GB"/>
           </a:p>
@@ -948,7 +950,7 @@
           <a:p>
             <a:fld id="{464D1A74-3978-4083-A08F-264BF0F8F209}" type="datetimeFigureOut">
               <a:rPr lang="en-GB" smtClean="0"/>
-              <a:t>13/10/2020</a:t>
+              <a:t>15/10/2020</a:t>
             </a:fld>
             <a:endParaRPr lang="en-GB"/>
           </a:p>
@@ -1148,7 +1150,7 @@
           <a:p>
             <a:fld id="{464D1A74-3978-4083-A08F-264BF0F8F209}" type="datetimeFigureOut">
               <a:rPr lang="en-GB" smtClean="0"/>
-              <a:t>13/10/2020</a:t>
+              <a:t>15/10/2020</a:t>
             </a:fld>
             <a:endParaRPr lang="en-GB"/>
           </a:p>
@@ -1358,7 +1360,7 @@
           <a:p>
             <a:fld id="{464D1A74-3978-4083-A08F-264BF0F8F209}" type="datetimeFigureOut">
               <a:rPr lang="en-GB" smtClean="0"/>
-              <a:t>13/10/2020</a:t>
+              <a:t>15/10/2020</a:t>
             </a:fld>
             <a:endParaRPr lang="en-GB"/>
           </a:p>
@@ -1558,7 +1560,7 @@
           <a:p>
             <a:fld id="{464D1A74-3978-4083-A08F-264BF0F8F209}" type="datetimeFigureOut">
               <a:rPr lang="en-GB" smtClean="0"/>
-              <a:t>13/10/2020</a:t>
+              <a:t>15/10/2020</a:t>
             </a:fld>
             <a:endParaRPr lang="en-GB"/>
           </a:p>
@@ -1834,7 +1836,7 @@
           <a:p>
             <a:fld id="{464D1A74-3978-4083-A08F-264BF0F8F209}" type="datetimeFigureOut">
               <a:rPr lang="en-GB" smtClean="0"/>
-              <a:t>13/10/2020</a:t>
+              <a:t>15/10/2020</a:t>
             </a:fld>
             <a:endParaRPr lang="en-GB"/>
           </a:p>
@@ -2102,7 +2104,7 @@
           <a:p>
             <a:fld id="{464D1A74-3978-4083-A08F-264BF0F8F209}" type="datetimeFigureOut">
               <a:rPr lang="en-GB" smtClean="0"/>
-              <a:t>13/10/2020</a:t>
+              <a:t>15/10/2020</a:t>
             </a:fld>
             <a:endParaRPr lang="en-GB"/>
           </a:p>
@@ -2517,7 +2519,7 @@
           <a:p>
             <a:fld id="{464D1A74-3978-4083-A08F-264BF0F8F209}" type="datetimeFigureOut">
               <a:rPr lang="en-GB" smtClean="0"/>
-              <a:t>13/10/2020</a:t>
+              <a:t>15/10/2020</a:t>
             </a:fld>
             <a:endParaRPr lang="en-GB"/>
           </a:p>
@@ -2659,7 +2661,7 @@
           <a:p>
             <a:fld id="{464D1A74-3978-4083-A08F-264BF0F8F209}" type="datetimeFigureOut">
               <a:rPr lang="en-GB" smtClean="0"/>
-              <a:t>13/10/2020</a:t>
+              <a:t>15/10/2020</a:t>
             </a:fld>
             <a:endParaRPr lang="en-GB"/>
           </a:p>
@@ -2772,7 +2774,7 @@
           <a:p>
             <a:fld id="{464D1A74-3978-4083-A08F-264BF0F8F209}" type="datetimeFigureOut">
               <a:rPr lang="en-GB" smtClean="0"/>
-              <a:t>13/10/2020</a:t>
+              <a:t>15/10/2020</a:t>
             </a:fld>
             <a:endParaRPr lang="en-GB"/>
           </a:p>
@@ -3085,7 +3087,7 @@
           <a:p>
             <a:fld id="{464D1A74-3978-4083-A08F-264BF0F8F209}" type="datetimeFigureOut">
               <a:rPr lang="en-GB" smtClean="0"/>
-              <a:t>13/10/2020</a:t>
+              <a:t>15/10/2020</a:t>
             </a:fld>
             <a:endParaRPr lang="en-GB"/>
           </a:p>
@@ -3374,7 +3376,7 @@
           <a:p>
             <a:fld id="{464D1A74-3978-4083-A08F-264BF0F8F209}" type="datetimeFigureOut">
               <a:rPr lang="en-GB" smtClean="0"/>
-              <a:t>13/10/2020</a:t>
+              <a:t>15/10/2020</a:t>
             </a:fld>
             <a:endParaRPr lang="en-GB"/>
           </a:p>
@@ -3617,7 +3619,7 @@
           <a:p>
             <a:fld id="{464D1A74-3978-4083-A08F-264BF0F8F209}" type="datetimeFigureOut">
               <a:rPr lang="en-GB" smtClean="0"/>
-              <a:t>13/10/2020</a:t>
+              <a:t>15/10/2020</a:t>
             </a:fld>
             <a:endParaRPr lang="en-GB"/>
           </a:p>
@@ -5624,6 +5626,41 @@
           </a:p>
         </p:txBody>
       </p:sp>
+      <p:sp>
+        <p:nvSpPr>
+          <p:cNvPr id="3" name="TextBox 2">
+            <a:extLst>
+              <a:ext uri="{FF2B5EF4-FFF2-40B4-BE49-F238E27FC236}">
+                <a16:creationId xmlns:a16="http://schemas.microsoft.com/office/drawing/2014/main" id="{0D74DD5D-2D82-4F08-8DE8-7B94A3B8F2EB}"/>
+              </a:ext>
+            </a:extLst>
+          </p:cNvPr>
+          <p:cNvSpPr txBox="1"/>
+          <p:nvPr/>
+        </p:nvSpPr>
+        <p:spPr>
+          <a:xfrm>
+            <a:off x="838200" y="5571269"/>
+            <a:ext cx="689906" cy="366855"/>
+          </a:xfrm>
+          <a:prstGeom prst="rect">
+            <a:avLst/>
+          </a:prstGeom>
+          <a:noFill/>
+        </p:spPr>
+        <p:txBody>
+          <a:bodyPr wrap="square" rtlCol="0">
+            <a:spAutoFit/>
+          </a:bodyPr>
+          <a:lstStyle/>
+          <a:p>
+            <a:r>
+              <a:rPr lang="en-GB" dirty="0"/>
+              <a:t>[999]</a:t>
+            </a:r>
+          </a:p>
+        </p:txBody>
+      </p:sp>
     </p:spTree>
     <p:extLst>
       <p:ext uri="{BB962C8B-B14F-4D97-AF65-F5344CB8AC3E}">
@@ -5895,7 +5932,10 @@
           <a:bodyPr/>
           <a:lstStyle/>
           <a:p>
-            <a:endParaRPr lang="en-GB"/>
+            <a:r>
+              <a:rPr lang="en-GB" dirty="0"/>
+              <a:t>Demonstration</a:t>
+            </a:r>
           </a:p>
         </p:txBody>
       </p:sp>
@@ -5903,6 +5943,166 @@
     <p:extLst>
       <p:ext uri="{BB962C8B-B14F-4D97-AF65-F5344CB8AC3E}">
         <p14:creationId xmlns:p14="http://schemas.microsoft.com/office/powerpoint/2010/main" val="1950086364"/>
+      </p:ext>
+    </p:extLst>
+  </p:cSld>
+  <p:clrMapOvr>
+    <a:masterClrMapping/>
+  </p:clrMapOvr>
+</p:sld>
+</file>
+
+<file path=ppt/slides/slide8.xml><?xml version="1.0" encoding="utf-8"?>
+<p:sld xmlns:a="http://schemas.openxmlformats.org/drawingml/2006/main" xmlns:r="http://schemas.openxmlformats.org/officeDocument/2006/relationships" xmlns:p="http://schemas.openxmlformats.org/presentationml/2006/main">
+  <p:cSld>
+    <p:spTree>
+      <p:nvGrpSpPr>
+        <p:cNvPr id="1" name=""/>
+        <p:cNvGrpSpPr/>
+        <p:nvPr/>
+      </p:nvGrpSpPr>
+      <p:grpSpPr>
+        <a:xfrm>
+          <a:off x="0" y="0"/>
+          <a:ext cx="0" cy="0"/>
+          <a:chOff x="0" y="0"/>
+          <a:chExt cx="0" cy="0"/>
+        </a:xfrm>
+      </p:grpSpPr>
+      <p:sp>
+        <p:nvSpPr>
+          <p:cNvPr id="2" name="Title 1">
+            <a:extLst>
+              <a:ext uri="{FF2B5EF4-FFF2-40B4-BE49-F238E27FC236}">
+                <a16:creationId xmlns:a16="http://schemas.microsoft.com/office/drawing/2014/main" id="{FC8E0E28-1CCF-49F0-8C77-2E7A50417E56}"/>
+              </a:ext>
+            </a:extLst>
+          </p:cNvPr>
+          <p:cNvSpPr>
+            <a:spLocks noGrp="1"/>
+          </p:cNvSpPr>
+          <p:nvPr>
+            <p:ph type="title"/>
+          </p:nvPr>
+        </p:nvSpPr>
+        <p:spPr>
+          <a:xfrm>
+            <a:off x="553476" y="2538879"/>
+            <a:ext cx="10515600" cy="1325563"/>
+          </a:xfrm>
+        </p:spPr>
+        <p:txBody>
+          <a:bodyPr/>
+          <a:lstStyle/>
+          <a:p>
+            <a:pPr algn="ctr"/>
+            <a:r>
+              <a:rPr lang="en-GB" dirty="0"/>
+              <a:t>Questions?</a:t>
+            </a:r>
+          </a:p>
+        </p:txBody>
+      </p:sp>
+    </p:spTree>
+    <p:extLst>
+      <p:ext uri="{BB962C8B-B14F-4D97-AF65-F5344CB8AC3E}">
+        <p14:creationId xmlns:p14="http://schemas.microsoft.com/office/powerpoint/2010/main" val="1814036287"/>
+      </p:ext>
+    </p:extLst>
+  </p:cSld>
+  <p:clrMapOvr>
+    <a:masterClrMapping/>
+  </p:clrMapOvr>
+</p:sld>
+</file>
+
+<file path=ppt/slides/slide9.xml><?xml version="1.0" encoding="utf-8"?>
+<p:sld xmlns:a="http://schemas.openxmlformats.org/drawingml/2006/main" xmlns:r="http://schemas.openxmlformats.org/officeDocument/2006/relationships" xmlns:p="http://schemas.openxmlformats.org/presentationml/2006/main">
+  <p:cSld>
+    <p:spTree>
+      <p:nvGrpSpPr>
+        <p:cNvPr id="1" name=""/>
+        <p:cNvGrpSpPr/>
+        <p:nvPr/>
+      </p:nvGrpSpPr>
+      <p:grpSpPr>
+        <a:xfrm>
+          <a:off x="0" y="0"/>
+          <a:ext cx="0" cy="0"/>
+          <a:chOff x="0" y="0"/>
+          <a:chExt cx="0" cy="0"/>
+        </a:xfrm>
+      </p:grpSpPr>
+      <p:sp>
+        <p:nvSpPr>
+          <p:cNvPr id="2" name="Title 1">
+            <a:extLst>
+              <a:ext uri="{FF2B5EF4-FFF2-40B4-BE49-F238E27FC236}">
+                <a16:creationId xmlns:a16="http://schemas.microsoft.com/office/drawing/2014/main" id="{731E5D74-A91E-408C-91DE-EBF1D36B3DC7}"/>
+              </a:ext>
+            </a:extLst>
+          </p:cNvPr>
+          <p:cNvSpPr>
+            <a:spLocks noGrp="1"/>
+          </p:cNvSpPr>
+          <p:nvPr>
+            <p:ph type="title"/>
+          </p:nvPr>
+        </p:nvSpPr>
+        <p:spPr/>
+        <p:txBody>
+          <a:bodyPr/>
+          <a:lstStyle/>
+          <a:p>
+            <a:r>
+              <a:rPr lang="en-GB" dirty="0"/>
+              <a:t>Reference:</a:t>
+            </a:r>
+          </a:p>
+        </p:txBody>
+      </p:sp>
+      <p:sp>
+        <p:nvSpPr>
+          <p:cNvPr id="3" name="Content Placeholder 2">
+            <a:extLst>
+              <a:ext uri="{FF2B5EF4-FFF2-40B4-BE49-F238E27FC236}">
+                <a16:creationId xmlns:a16="http://schemas.microsoft.com/office/drawing/2014/main" id="{D4411F9E-B603-459A-8F01-99C424426518}"/>
+              </a:ext>
+            </a:extLst>
+          </p:cNvPr>
+          <p:cNvSpPr>
+            <a:spLocks noGrp="1"/>
+          </p:cNvSpPr>
+          <p:nvPr>
+            <p:ph idx="1"/>
+          </p:nvPr>
+        </p:nvSpPr>
+        <p:spPr/>
+        <p:txBody>
+          <a:bodyPr/>
+          <a:lstStyle/>
+          <a:p>
+            <a:r>
+              <a:rPr lang="en-GB" dirty="0"/>
+              <a:t>[999] </a:t>
+            </a:r>
+            <a:r>
+              <a:rPr lang="en-GB" dirty="0">
+                <a:hlinkClick r:id="rId2"/>
+              </a:rPr>
+              <a:t>https://www.callofduty.com/content/dam/atvi/callofduty/wwii/home/sh-overview.jpg</a:t>
+            </a:r>
+            <a:endParaRPr lang="en-GB" dirty="0"/>
+          </a:p>
+          <a:p>
+            <a:endParaRPr lang="en-GB" dirty="0"/>
+          </a:p>
+        </p:txBody>
+      </p:sp>
+    </p:spTree>
+    <p:extLst>
+      <p:ext uri="{BB962C8B-B14F-4D97-AF65-F5344CB8AC3E}">
+        <p14:creationId xmlns:p14="http://schemas.microsoft.com/office/powerpoint/2010/main" val="2157916201"/>
       </p:ext>
     </p:extLst>
   </p:cSld>

</xml_diff>

<commit_message>
Make CW Presentation better
</commit_message>
<xml_diff>
--- a/Challenge Week/Challenge Week Presentation.pptx
+++ b/Challenge Week/Challenge Week Presentation.pptx
@@ -9,10 +9,10 @@
   </p:notesMasterIdLst>
   <p:sldIdLst>
     <p:sldId id="256" r:id="rId2"/>
-    <p:sldId id="260" r:id="rId3"/>
-    <p:sldId id="261" r:id="rId4"/>
-    <p:sldId id="257" r:id="rId5"/>
-    <p:sldId id="262" r:id="rId6"/>
+    <p:sldId id="257" r:id="rId3"/>
+    <p:sldId id="265" r:id="rId4"/>
+    <p:sldId id="260" r:id="rId5"/>
+    <p:sldId id="261" r:id="rId6"/>
     <p:sldId id="258" r:id="rId7"/>
     <p:sldId id="259" r:id="rId8"/>
     <p:sldId id="263" r:id="rId9"/>
@@ -517,27 +517,95 @@
           <a:bodyPr/>
           <a:lstStyle/>
           <a:p>
-            <a:pPr marL="0" marR="0" lvl="0" indent="0" algn="l" defTabSz="914400" rtl="0" eaLnBrk="1" fontAlgn="auto" latinLnBrk="0" hangingPunct="1">
-              <a:lnSpc>
-                <a:spcPct val="100000"/>
-              </a:lnSpc>
-              <a:spcBef>
-                <a:spcPts val="0"/>
-              </a:spcBef>
-              <a:spcAft>
-                <a:spcPts val="0"/>
-              </a:spcAft>
-              <a:buClrTx/>
-              <a:buSzTx/>
+            <a:r>
+              <a:rPr lang="en-GB" dirty="0" err="1"/>
+              <a:t>Cuz</a:t>
+            </a:r>
+            <a:r>
+              <a:rPr lang="en-GB" dirty="0"/>
+              <a:t> I want to bring brotherhood in the modern world</a:t>
+            </a:r>
+          </a:p>
+          <a:p>
+            <a:r>
+              <a:rPr lang="en-GB" dirty="0"/>
+              <a:t>What is brotherhood?</a:t>
+            </a:r>
+          </a:p>
+          <a:p>
+            <a:r>
+              <a:rPr lang="en-GB" dirty="0"/>
+              <a:t>Adv/Disadv</a:t>
+            </a:r>
+          </a:p>
+          <a:p>
+            <a:r>
+              <a:rPr lang="en-GB" dirty="0"/>
+              <a:t>If </a:t>
+            </a:r>
+            <a:r>
+              <a:rPr lang="en-GB" dirty="0" err="1"/>
+              <a:t>brohood</a:t>
+            </a:r>
+            <a:r>
+              <a:rPr lang="en-GB" dirty="0"/>
+              <a:t> is </a:t>
+            </a:r>
+            <a:r>
+              <a:rPr lang="en-GB" dirty="0" err="1"/>
+              <a:t>soo</a:t>
+            </a:r>
+            <a:r>
+              <a:rPr lang="en-GB" dirty="0"/>
+              <a:t> good why is it lost In our society?</a:t>
+            </a:r>
+          </a:p>
+          <a:p>
+            <a:r>
+              <a:rPr lang="en-GB" dirty="0"/>
+              <a:t>How have others gone about solving this problem?</a:t>
+            </a:r>
+          </a:p>
+          <a:p>
+            <a:r>
+              <a:rPr lang="en-GB" dirty="0"/>
+              <a:t>Why building an app is one of the best ways to solve this issue?</a:t>
+            </a:r>
+          </a:p>
+          <a:p>
+            <a:endParaRPr lang="en-GB" dirty="0"/>
+          </a:p>
+          <a:p>
+            <a:r>
+              <a:rPr lang="en-GB" dirty="0"/>
+              <a:t>Aim is to bring the brotherhood to our modern civil life. Why?</a:t>
+            </a:r>
+          </a:p>
+          <a:p>
+            <a:pPr marL="285750" indent="-285750">
               <a:buFontTx/>
-              <a:buNone/>
-              <a:tabLst/>
-              <a:defRPr/>
+              <a:buChar char="-"/>
             </a:pPr>
             <a:r>
               <a:rPr lang="en-GB" dirty="0"/>
-              <a:t>Show what you are planning build for the whole year</a:t>
-            </a:r>
+              <a:t>Accelerate self-improvement via ‘proving each other that they deserve to be part of the team’ [6] (Background Research Section: Disadv of brotherhood)</a:t>
+            </a:r>
+          </a:p>
+          <a:p>
+            <a:pPr marL="285750" indent="-285750">
+              <a:buFontTx/>
+              <a:buChar char="-"/>
+            </a:pPr>
+            <a:r>
+              <a:rPr lang="en-GB" dirty="0"/>
+              <a:t>For well-being as claimed by [8] (Background Research Section: Adv of brotherhood)</a:t>
+            </a:r>
+          </a:p>
+          <a:p>
+            <a:endParaRPr lang="en-GB" dirty="0"/>
+          </a:p>
+          <a:p>
+            <a:endParaRPr lang="en-GB" dirty="0"/>
           </a:p>
         </p:txBody>
       </p:sp>
@@ -567,7 +635,7 @@
     </p:spTree>
     <p:extLst>
       <p:ext uri="{BB962C8B-B14F-4D97-AF65-F5344CB8AC3E}">
-        <p14:creationId xmlns:p14="http://schemas.microsoft.com/office/powerpoint/2010/main" val="3328478914"/>
+        <p14:creationId xmlns:p14="http://schemas.microsoft.com/office/powerpoint/2010/main" val="3736471127"/>
       </p:ext>
     </p:extLst>
   </p:cSld>
@@ -621,63 +689,27 @@
           <a:bodyPr/>
           <a:lstStyle/>
           <a:p>
-            <a:r>
-              <a:rPr lang="en-GB" dirty="0" err="1"/>
-              <a:t>Cuz</a:t>
-            </a:r>
+            <a:pPr marL="0" marR="0" lvl="0" indent="0" algn="l" defTabSz="914400" rtl="0" eaLnBrk="1" fontAlgn="auto" latinLnBrk="0" hangingPunct="1">
+              <a:lnSpc>
+                <a:spcPct val="100000"/>
+              </a:lnSpc>
+              <a:spcBef>
+                <a:spcPts val="0"/>
+              </a:spcBef>
+              <a:spcAft>
+                <a:spcPts val="0"/>
+              </a:spcAft>
+              <a:buClrTx/>
+              <a:buSzTx/>
+              <a:buFontTx/>
+              <a:buNone/>
+              <a:tabLst/>
+              <a:defRPr/>
+            </a:pPr>
             <a:r>
               <a:rPr lang="en-GB" dirty="0"/>
-              <a:t> I want to bring brotherhood in the modern world</a:t>
-            </a:r>
-          </a:p>
-          <a:p>
-            <a:r>
-              <a:rPr lang="en-GB" dirty="0"/>
-              <a:t>What is brotherhood?</a:t>
-            </a:r>
-          </a:p>
-          <a:p>
-            <a:r>
-              <a:rPr lang="en-GB" dirty="0"/>
-              <a:t>Adv/Disadv</a:t>
-            </a:r>
-          </a:p>
-          <a:p>
-            <a:r>
-              <a:rPr lang="en-GB" dirty="0"/>
-              <a:t>If </a:t>
-            </a:r>
-            <a:r>
-              <a:rPr lang="en-GB" dirty="0" err="1"/>
-              <a:t>brohood</a:t>
-            </a:r>
-            <a:r>
-              <a:rPr lang="en-GB" dirty="0"/>
-              <a:t> is </a:t>
-            </a:r>
-            <a:r>
-              <a:rPr lang="en-GB" dirty="0" err="1"/>
-              <a:t>soo</a:t>
-            </a:r>
-            <a:r>
-              <a:rPr lang="en-GB" dirty="0"/>
-              <a:t> good why is it lost In our society?</a:t>
-            </a:r>
-          </a:p>
-          <a:p>
-            <a:r>
-              <a:rPr lang="en-GB" dirty="0"/>
-              <a:t>How have others gone about solving this problem?</a:t>
-            </a:r>
-          </a:p>
-          <a:p>
-            <a:r>
-              <a:rPr lang="en-GB" dirty="0"/>
-              <a:t>Why building an app is one of the best ways to solve this issue?</a:t>
-            </a:r>
-          </a:p>
-          <a:p>
-            <a:endParaRPr lang="en-GB" dirty="0"/>
+              <a:t>Show what you are planning build for the whole year</a:t>
+            </a:r>
           </a:p>
         </p:txBody>
       </p:sp>
@@ -707,91 +739,7 @@
     </p:spTree>
     <p:extLst>
       <p:ext uri="{BB962C8B-B14F-4D97-AF65-F5344CB8AC3E}">
-        <p14:creationId xmlns:p14="http://schemas.microsoft.com/office/powerpoint/2010/main" val="3736471127"/>
-      </p:ext>
-    </p:extLst>
-  </p:cSld>
-  <p:clrMapOvr>
-    <a:masterClrMapping/>
-  </p:clrMapOvr>
-</p:notes>
-</file>
-
-<file path=ppt/notesSlides/notesSlide3.xml><?xml version="1.0" encoding="utf-8"?>
-<p:notes xmlns:a="http://schemas.openxmlformats.org/drawingml/2006/main" xmlns:r="http://schemas.openxmlformats.org/officeDocument/2006/relationships" xmlns:p="http://schemas.openxmlformats.org/presentationml/2006/main">
-  <p:cSld>
-    <p:spTree>
-      <p:nvGrpSpPr>
-        <p:cNvPr id="1" name=""/>
-        <p:cNvGrpSpPr/>
-        <p:nvPr/>
-      </p:nvGrpSpPr>
-      <p:grpSpPr>
-        <a:xfrm>
-          <a:off x="0" y="0"/>
-          <a:ext cx="0" cy="0"/>
-          <a:chOff x="0" y="0"/>
-          <a:chExt cx="0" cy="0"/>
-        </a:xfrm>
-      </p:grpSpPr>
-      <p:sp>
-        <p:nvSpPr>
-          <p:cNvPr id="2" name="Slide Image Placeholder 1"/>
-          <p:cNvSpPr>
-            <a:spLocks noGrp="1" noRot="1" noChangeAspect="1"/>
-          </p:cNvSpPr>
-          <p:nvPr>
-            <p:ph type="sldImg"/>
-          </p:nvPr>
-        </p:nvSpPr>
-        <p:spPr/>
-      </p:sp>
-      <p:sp>
-        <p:nvSpPr>
-          <p:cNvPr id="3" name="Notes Placeholder 2"/>
-          <p:cNvSpPr>
-            <a:spLocks noGrp="1"/>
-          </p:cNvSpPr>
-          <p:nvPr>
-            <p:ph type="body" idx="1"/>
-          </p:nvPr>
-        </p:nvSpPr>
-        <p:spPr/>
-        <p:txBody>
-          <a:bodyPr/>
-          <a:lstStyle/>
-          <a:p>
-            <a:endParaRPr lang="en-GB" dirty="0"/>
-          </a:p>
-        </p:txBody>
-      </p:sp>
-      <p:sp>
-        <p:nvSpPr>
-          <p:cNvPr id="4" name="Slide Number Placeholder 3"/>
-          <p:cNvSpPr>
-            <a:spLocks noGrp="1"/>
-          </p:cNvSpPr>
-          <p:nvPr>
-            <p:ph type="sldNum" sz="quarter" idx="5"/>
-          </p:nvPr>
-        </p:nvSpPr>
-        <p:spPr/>
-        <p:txBody>
-          <a:bodyPr/>
-          <a:lstStyle/>
-          <a:p>
-            <a:fld id="{BB0EFA0C-2783-471D-8939-2BE70A2A34FC}" type="slidenum">
-              <a:rPr lang="en-GB" smtClean="0"/>
-              <a:t>5</a:t>
-            </a:fld>
-            <a:endParaRPr lang="en-GB"/>
-          </a:p>
-        </p:txBody>
-      </p:sp>
-    </p:spTree>
-    <p:extLst>
-      <p:ext uri="{BB962C8B-B14F-4D97-AF65-F5344CB8AC3E}">
-        <p14:creationId xmlns:p14="http://schemas.microsoft.com/office/powerpoint/2010/main" val="943958683"/>
+        <p14:creationId xmlns:p14="http://schemas.microsoft.com/office/powerpoint/2010/main" val="3328478914"/>
       </p:ext>
     </p:extLst>
   </p:cSld>
@@ -4059,7 +4007,7 @@
           <a:p>
             <a:r>
               <a:rPr lang="en-GB" dirty="0"/>
-              <a:t>Bro-Online</a:t>
+              <a:t>Capstone Project</a:t>
             </a:r>
           </a:p>
         </p:txBody>
@@ -4087,7 +4035,7 @@
           <a:p>
             <a:r>
               <a:rPr lang="en-GB" dirty="0"/>
-              <a:t>By Ajaya Rai</a:t>
+              <a:t>By Ajaya Rai (AJ)</a:t>
             </a:r>
           </a:p>
         </p:txBody>
@@ -4127,6 +4075,354 @@
           <p:cNvPr id="2" name="Title 1">
             <a:extLst>
               <a:ext uri="{FF2B5EF4-FFF2-40B4-BE49-F238E27FC236}">
+                <a16:creationId xmlns:a16="http://schemas.microsoft.com/office/drawing/2014/main" id="{D83C7985-6ABA-441A-9120-1D02C047D66A}"/>
+              </a:ext>
+            </a:extLst>
+          </p:cNvPr>
+          <p:cNvSpPr>
+            <a:spLocks noGrp="1"/>
+          </p:cNvSpPr>
+          <p:nvPr>
+            <p:ph type="title"/>
+          </p:nvPr>
+        </p:nvSpPr>
+        <p:spPr/>
+        <p:txBody>
+          <a:bodyPr/>
+          <a:lstStyle/>
+          <a:p>
+            <a:r>
+              <a:rPr lang="en-GB" dirty="0"/>
+              <a:t>Background</a:t>
+            </a:r>
+          </a:p>
+        </p:txBody>
+      </p:sp>
+      <p:pic>
+        <p:nvPicPr>
+          <p:cNvPr id="2050" name="Picture 2">
+            <a:extLst>
+              <a:ext uri="{FF2B5EF4-FFF2-40B4-BE49-F238E27FC236}">
+                <a16:creationId xmlns:a16="http://schemas.microsoft.com/office/drawing/2014/main" id="{6F7CD84D-3F4D-40E9-BA8A-124D2BA9F255}"/>
+              </a:ext>
+            </a:extLst>
+          </p:cNvPr>
+          <p:cNvPicPr>
+            <a:picLocks noGrp="1" noChangeAspect="1" noChangeArrowheads="1"/>
+          </p:cNvPicPr>
+          <p:nvPr>
+            <p:ph idx="1"/>
+          </p:nvPr>
+        </p:nvPicPr>
+        <p:blipFill>
+          <a:blip r:embed="rId3">
+            <a:extLst>
+              <a:ext uri="{28A0092B-C50C-407E-A947-70E740481C1C}">
+                <a14:useLocalDpi xmlns:a14="http://schemas.microsoft.com/office/drawing/2010/main" val="0"/>
+              </a:ext>
+            </a:extLst>
+          </a:blip>
+          <a:srcRect/>
+          <a:stretch>
+            <a:fillRect/>
+          </a:stretch>
+        </p:blipFill>
+        <p:spPr bwMode="auto">
+          <a:xfrm>
+            <a:off x="938212" y="1990003"/>
+            <a:ext cx="6296206" cy="3537961"/>
+          </a:xfrm>
+          <a:prstGeom prst="rect">
+            <a:avLst/>
+          </a:prstGeom>
+          <a:noFill/>
+          <a:extLst>
+            <a:ext uri="{909E8E84-426E-40DD-AFC4-6F175D3DCCD1}">
+              <a14:hiddenFill xmlns:a14="http://schemas.microsoft.com/office/drawing/2010/main">
+                <a:solidFill>
+                  <a:srgbClr val="FFFFFF"/>
+                </a:solidFill>
+              </a14:hiddenFill>
+            </a:ext>
+          </a:extLst>
+        </p:spPr>
+      </p:pic>
+      <p:sp>
+        <p:nvSpPr>
+          <p:cNvPr id="5" name="TextBox 4">
+            <a:extLst>
+              <a:ext uri="{FF2B5EF4-FFF2-40B4-BE49-F238E27FC236}">
+                <a16:creationId xmlns:a16="http://schemas.microsoft.com/office/drawing/2014/main" id="{1673775F-1CB5-409D-BCDB-23A7D8C863F5}"/>
+              </a:ext>
+            </a:extLst>
+          </p:cNvPr>
+          <p:cNvSpPr txBox="1"/>
+          <p:nvPr/>
+        </p:nvSpPr>
+        <p:spPr>
+          <a:xfrm>
+            <a:off x="7703957" y="1990003"/>
+            <a:ext cx="3921986" cy="4801314"/>
+          </a:xfrm>
+          <a:prstGeom prst="rect">
+            <a:avLst/>
+          </a:prstGeom>
+          <a:noFill/>
+        </p:spPr>
+        <p:txBody>
+          <a:bodyPr wrap="square" rtlCol="0">
+            <a:spAutoFit/>
+          </a:bodyPr>
+          <a:lstStyle/>
+          <a:p>
+            <a:pPr marL="285750" indent="-285750">
+              <a:buFont typeface="Arial" panose="020B0604020202020204" pitchFamily="34" charset="0"/>
+              <a:buChar char="•"/>
+            </a:pPr>
+            <a:r>
+              <a:rPr lang="en-GB" dirty="0"/>
+              <a:t>What is brotherhood? -&gt; Relationship of brothers.</a:t>
+            </a:r>
+          </a:p>
+          <a:p>
+            <a:pPr marL="285750" indent="-285750">
+              <a:buFont typeface="Arial" panose="020B0604020202020204" pitchFamily="34" charset="0"/>
+              <a:buChar char="•"/>
+            </a:pPr>
+            <a:r>
+              <a:rPr lang="en-GB" dirty="0"/>
+              <a:t>Adv/Disadv of brotherhood -&gt; It’s amoral. Positively using it; e.g. self improvement.</a:t>
+            </a:r>
+          </a:p>
+          <a:p>
+            <a:pPr marL="285750" indent="-285750">
+              <a:buFont typeface="Arial" panose="020B0604020202020204" pitchFamily="34" charset="0"/>
+              <a:buChar char="•"/>
+            </a:pPr>
+            <a:r>
+              <a:rPr lang="en-GB" dirty="0"/>
+              <a:t>Why brotherhood lost in our society? -&gt; Two evolution: Maximise individual gain + Community</a:t>
+            </a:r>
+          </a:p>
+          <a:p>
+            <a:pPr marL="285750" indent="-285750">
+              <a:buFont typeface="Arial" panose="020B0604020202020204" pitchFamily="34" charset="0"/>
+              <a:buChar char="•"/>
+            </a:pPr>
+            <a:r>
+              <a:rPr lang="en-GB" dirty="0"/>
+              <a:t>How have others gone about creating the brotherhood within our society? -&gt; Using initiative, e.g. sleeping over to neighbour house, seeing existing friends who are like minded, finding existing group else creating your own.</a:t>
+            </a:r>
+          </a:p>
+          <a:p>
+            <a:endParaRPr lang="en-GB" dirty="0"/>
+          </a:p>
+          <a:p>
+            <a:pPr marL="285750" indent="-285750">
+              <a:buFontTx/>
+              <a:buChar char="-"/>
+            </a:pPr>
+            <a:endParaRPr lang="en-GB" dirty="0"/>
+          </a:p>
+        </p:txBody>
+      </p:sp>
+      <p:sp>
+        <p:nvSpPr>
+          <p:cNvPr id="3" name="TextBox 2">
+            <a:extLst>
+              <a:ext uri="{FF2B5EF4-FFF2-40B4-BE49-F238E27FC236}">
+                <a16:creationId xmlns:a16="http://schemas.microsoft.com/office/drawing/2014/main" id="{0D74DD5D-2D82-4F08-8DE8-7B94A3B8F2EB}"/>
+              </a:ext>
+            </a:extLst>
+          </p:cNvPr>
+          <p:cNvSpPr txBox="1"/>
+          <p:nvPr/>
+        </p:nvSpPr>
+        <p:spPr>
+          <a:xfrm>
+            <a:off x="838200" y="5571269"/>
+            <a:ext cx="689906" cy="366855"/>
+          </a:xfrm>
+          <a:prstGeom prst="rect">
+            <a:avLst/>
+          </a:prstGeom>
+          <a:noFill/>
+        </p:spPr>
+        <p:txBody>
+          <a:bodyPr wrap="square" rtlCol="0">
+            <a:spAutoFit/>
+          </a:bodyPr>
+          <a:lstStyle/>
+          <a:p>
+            <a:r>
+              <a:rPr lang="en-GB" dirty="0"/>
+              <a:t>[999]</a:t>
+            </a:r>
+          </a:p>
+        </p:txBody>
+      </p:sp>
+    </p:spTree>
+    <p:extLst>
+      <p:ext uri="{BB962C8B-B14F-4D97-AF65-F5344CB8AC3E}">
+        <p14:creationId xmlns:p14="http://schemas.microsoft.com/office/powerpoint/2010/main" val="2688071013"/>
+      </p:ext>
+    </p:extLst>
+  </p:cSld>
+  <p:clrMapOvr>
+    <a:masterClrMapping/>
+  </p:clrMapOvr>
+</p:sld>
+</file>
+
+<file path=ppt/slides/slide3.xml><?xml version="1.0" encoding="utf-8"?>
+<p:sld xmlns:a="http://schemas.openxmlformats.org/drawingml/2006/main" xmlns:r="http://schemas.openxmlformats.org/officeDocument/2006/relationships" xmlns:p="http://schemas.openxmlformats.org/presentationml/2006/main">
+  <p:cSld>
+    <p:spTree>
+      <p:nvGrpSpPr>
+        <p:cNvPr id="1" name=""/>
+        <p:cNvGrpSpPr/>
+        <p:nvPr/>
+      </p:nvGrpSpPr>
+      <p:grpSpPr>
+        <a:xfrm>
+          <a:off x="0" y="0"/>
+          <a:ext cx="0" cy="0"/>
+          <a:chOff x="0" y="0"/>
+          <a:chExt cx="0" cy="0"/>
+        </a:xfrm>
+      </p:grpSpPr>
+      <p:sp>
+        <p:nvSpPr>
+          <p:cNvPr id="2" name="Title 1">
+            <a:extLst>
+              <a:ext uri="{FF2B5EF4-FFF2-40B4-BE49-F238E27FC236}">
+                <a16:creationId xmlns:a16="http://schemas.microsoft.com/office/drawing/2014/main" id="{1D3F6D51-FC9D-4DB0-BA8C-3C057C3352B7}"/>
+              </a:ext>
+            </a:extLst>
+          </p:cNvPr>
+          <p:cNvSpPr>
+            <a:spLocks noGrp="1"/>
+          </p:cNvSpPr>
+          <p:nvPr>
+            <p:ph type="title"/>
+          </p:nvPr>
+        </p:nvSpPr>
+        <p:spPr/>
+        <p:txBody>
+          <a:bodyPr/>
+          <a:lstStyle/>
+          <a:p>
+            <a:r>
+              <a:rPr lang="en-GB" dirty="0"/>
+              <a:t>Background: part 2</a:t>
+            </a:r>
+          </a:p>
+        </p:txBody>
+      </p:sp>
+      <p:sp>
+        <p:nvSpPr>
+          <p:cNvPr id="3" name="Content Placeholder 2">
+            <a:extLst>
+              <a:ext uri="{FF2B5EF4-FFF2-40B4-BE49-F238E27FC236}">
+                <a16:creationId xmlns:a16="http://schemas.microsoft.com/office/drawing/2014/main" id="{3B090543-85C3-4C2D-9784-EB28A0363371}"/>
+              </a:ext>
+            </a:extLst>
+          </p:cNvPr>
+          <p:cNvSpPr>
+            <a:spLocks noGrp="1"/>
+          </p:cNvSpPr>
+          <p:nvPr>
+            <p:ph idx="1"/>
+          </p:nvPr>
+        </p:nvSpPr>
+        <p:spPr/>
+        <p:txBody>
+          <a:bodyPr/>
+          <a:lstStyle/>
+          <a:p>
+            <a:r>
+              <a:rPr lang="en-GB" dirty="0"/>
+              <a:t>Why building an app for creating/finding/maintaining the group is one of the best ways to solve this issue?</a:t>
+            </a:r>
+          </a:p>
+          <a:p>
+            <a:pPr lvl="1"/>
+            <a:r>
+              <a:rPr lang="en-GB" dirty="0"/>
+              <a:t>There’s always community/tribal groups, e.g. Facebook, Instagram, etc. But, never a gender specific, which focus is to build brotherhood. (Gap in the Market)</a:t>
+            </a:r>
+          </a:p>
+          <a:p>
+            <a:pPr lvl="1"/>
+            <a:r>
+              <a:rPr lang="en-GB" dirty="0"/>
+              <a:t>Finding the group/creating it is the hardest part</a:t>
+            </a:r>
+          </a:p>
+          <a:p>
+            <a:pPr lvl="1"/>
+            <a:r>
+              <a:rPr lang="en-GB" dirty="0"/>
+              <a:t>Takes long to find like-minded people</a:t>
+            </a:r>
+          </a:p>
+          <a:p>
+            <a:pPr lvl="1"/>
+            <a:r>
+              <a:rPr lang="en-GB" dirty="0"/>
+              <a:t>‘Conscious deliberate effort’</a:t>
+            </a:r>
+          </a:p>
+          <a:p>
+            <a:pPr lvl="1"/>
+            <a:r>
+              <a:rPr lang="en-GB" dirty="0"/>
+              <a:t>Acts as an advert/promotion</a:t>
+            </a:r>
+          </a:p>
+          <a:p>
+            <a:endParaRPr lang="en-GB" dirty="0"/>
+          </a:p>
+          <a:p>
+            <a:endParaRPr lang="en-GB" dirty="0"/>
+          </a:p>
+        </p:txBody>
+      </p:sp>
+    </p:spTree>
+    <p:extLst>
+      <p:ext uri="{BB962C8B-B14F-4D97-AF65-F5344CB8AC3E}">
+        <p14:creationId xmlns:p14="http://schemas.microsoft.com/office/powerpoint/2010/main" val="796047920"/>
+      </p:ext>
+    </p:extLst>
+  </p:cSld>
+  <p:clrMapOvr>
+    <a:masterClrMapping/>
+  </p:clrMapOvr>
+</p:sld>
+</file>
+
+<file path=ppt/slides/slide4.xml><?xml version="1.0" encoding="utf-8"?>
+<p:sld xmlns:a="http://schemas.openxmlformats.org/drawingml/2006/main" xmlns:r="http://schemas.openxmlformats.org/officeDocument/2006/relationships" xmlns:p="http://schemas.openxmlformats.org/presentationml/2006/main">
+  <p:cSld>
+    <p:spTree>
+      <p:nvGrpSpPr>
+        <p:cNvPr id="1" name=""/>
+        <p:cNvGrpSpPr/>
+        <p:nvPr/>
+      </p:nvGrpSpPr>
+      <p:grpSpPr>
+        <a:xfrm>
+          <a:off x="0" y="0"/>
+          <a:ext cx="0" cy="0"/>
+          <a:chOff x="0" y="0"/>
+          <a:chExt cx="0" cy="0"/>
+        </a:xfrm>
+      </p:grpSpPr>
+      <p:sp>
+        <p:nvSpPr>
+          <p:cNvPr id="2" name="Title 1">
+            <a:extLst>
+              <a:ext uri="{FF2B5EF4-FFF2-40B4-BE49-F238E27FC236}">
                 <a16:creationId xmlns:a16="http://schemas.microsoft.com/office/drawing/2014/main" id="{63BF16C8-8FAA-4DF3-BF96-203FC4F30E87}"/>
               </a:ext>
             </a:extLst>
@@ -4145,7 +4441,7 @@
           <a:p>
             <a:r>
               <a:rPr lang="en-GB" dirty="0"/>
-              <a:t>End Of The Year Product</a:t>
+              <a:t>End Of The Year Product Target</a:t>
             </a:r>
           </a:p>
         </p:txBody>
@@ -4180,6 +4476,36 @@
             <a:r>
               <a:rPr lang="en-GB" dirty="0"/>
               <a:t>Technologies use: ReactJS + Firebase</a:t>
+            </a:r>
+          </a:p>
+          <a:p>
+            <a:r>
+              <a:rPr lang="en-GB" dirty="0"/>
+              <a:t>ReactJS:</a:t>
+            </a:r>
+          </a:p>
+          <a:p>
+            <a:pPr lvl="1"/>
+            <a:r>
+              <a:rPr lang="en-GB" dirty="0"/>
+              <a:t>Built by Facebook; and other social media app are moving towards ReactJS</a:t>
+            </a:r>
+          </a:p>
+          <a:p>
+            <a:pPr lvl="1"/>
+            <a:endParaRPr lang="en-GB" dirty="0"/>
+          </a:p>
+          <a:p>
+            <a:r>
+              <a:rPr lang="en-GB" dirty="0"/>
+              <a:t>ReactJS + Firebase:</a:t>
+            </a:r>
+          </a:p>
+          <a:p>
+            <a:pPr lvl="1"/>
+            <a:r>
+              <a:rPr lang="en-GB" dirty="0"/>
+              <a:t> A lot of tutorial/help</a:t>
             </a:r>
           </a:p>
         </p:txBody>
@@ -4197,7 +4523,7 @@
 </p:sld>
 </file>
 
-<file path=ppt/slides/slide3.xml><?xml version="1.0" encoding="utf-8"?>
+<file path=ppt/slides/slide5.xml><?xml version="1.0" encoding="utf-8"?>
 <p:sld xmlns:a="http://schemas.openxmlformats.org/drawingml/2006/main" xmlns:r="http://schemas.openxmlformats.org/officeDocument/2006/relationships" xmlns:p="http://schemas.openxmlformats.org/presentationml/2006/main">
   <p:cSld>
     <p:spTree>
@@ -5461,316 +5787,6 @@
     <p:extLst>
       <p:ext uri="{BB962C8B-B14F-4D97-AF65-F5344CB8AC3E}">
         <p14:creationId xmlns:p14="http://schemas.microsoft.com/office/powerpoint/2010/main" val="2214323535"/>
-      </p:ext>
-    </p:extLst>
-  </p:cSld>
-  <p:clrMapOvr>
-    <a:masterClrMapping/>
-  </p:clrMapOvr>
-</p:sld>
-</file>
-
-<file path=ppt/slides/slide4.xml><?xml version="1.0" encoding="utf-8"?>
-<p:sld xmlns:a="http://schemas.openxmlformats.org/drawingml/2006/main" xmlns:r="http://schemas.openxmlformats.org/officeDocument/2006/relationships" xmlns:p="http://schemas.openxmlformats.org/presentationml/2006/main">
-  <p:cSld>
-    <p:spTree>
-      <p:nvGrpSpPr>
-        <p:cNvPr id="1" name=""/>
-        <p:cNvGrpSpPr/>
-        <p:nvPr/>
-      </p:nvGrpSpPr>
-      <p:grpSpPr>
-        <a:xfrm>
-          <a:off x="0" y="0"/>
-          <a:ext cx="0" cy="0"/>
-          <a:chOff x="0" y="0"/>
-          <a:chExt cx="0" cy="0"/>
-        </a:xfrm>
-      </p:grpSpPr>
-      <p:sp>
-        <p:nvSpPr>
-          <p:cNvPr id="2" name="Title 1">
-            <a:extLst>
-              <a:ext uri="{FF2B5EF4-FFF2-40B4-BE49-F238E27FC236}">
-                <a16:creationId xmlns:a16="http://schemas.microsoft.com/office/drawing/2014/main" id="{D83C7985-6ABA-441A-9120-1D02C047D66A}"/>
-              </a:ext>
-            </a:extLst>
-          </p:cNvPr>
-          <p:cNvSpPr>
-            <a:spLocks noGrp="1"/>
-          </p:cNvSpPr>
-          <p:nvPr>
-            <p:ph type="title"/>
-          </p:nvPr>
-        </p:nvSpPr>
-        <p:spPr/>
-        <p:txBody>
-          <a:bodyPr/>
-          <a:lstStyle/>
-          <a:p>
-            <a:r>
-              <a:rPr lang="en-GB" dirty="0"/>
-              <a:t>Why Bro-App?</a:t>
-            </a:r>
-          </a:p>
-        </p:txBody>
-      </p:sp>
-      <p:pic>
-        <p:nvPicPr>
-          <p:cNvPr id="2050" name="Picture 2">
-            <a:extLst>
-              <a:ext uri="{FF2B5EF4-FFF2-40B4-BE49-F238E27FC236}">
-                <a16:creationId xmlns:a16="http://schemas.microsoft.com/office/drawing/2014/main" id="{6F7CD84D-3F4D-40E9-BA8A-124D2BA9F255}"/>
-              </a:ext>
-            </a:extLst>
-          </p:cNvPr>
-          <p:cNvPicPr>
-            <a:picLocks noGrp="1" noChangeAspect="1" noChangeArrowheads="1"/>
-          </p:cNvPicPr>
-          <p:nvPr>
-            <p:ph idx="1"/>
-          </p:nvPr>
-        </p:nvPicPr>
-        <p:blipFill>
-          <a:blip r:embed="rId3">
-            <a:extLst>
-              <a:ext uri="{28A0092B-C50C-407E-A947-70E740481C1C}">
-                <a14:useLocalDpi xmlns:a14="http://schemas.microsoft.com/office/drawing/2010/main" val="0"/>
-              </a:ext>
-            </a:extLst>
-          </a:blip>
-          <a:srcRect/>
-          <a:stretch>
-            <a:fillRect/>
-          </a:stretch>
-        </p:blipFill>
-        <p:spPr bwMode="auto">
-          <a:xfrm>
-            <a:off x="938212" y="1990003"/>
-            <a:ext cx="6296206" cy="3537961"/>
-          </a:xfrm>
-          <a:prstGeom prst="rect">
-            <a:avLst/>
-          </a:prstGeom>
-          <a:noFill/>
-          <a:extLst>
-            <a:ext uri="{909E8E84-426E-40DD-AFC4-6F175D3DCCD1}">
-              <a14:hiddenFill xmlns:a14="http://schemas.microsoft.com/office/drawing/2010/main">
-                <a:solidFill>
-                  <a:srgbClr val="FFFFFF"/>
-                </a:solidFill>
-              </a14:hiddenFill>
-            </a:ext>
-          </a:extLst>
-        </p:spPr>
-      </p:pic>
-      <p:sp>
-        <p:nvSpPr>
-          <p:cNvPr id="5" name="TextBox 4">
-            <a:extLst>
-              <a:ext uri="{FF2B5EF4-FFF2-40B4-BE49-F238E27FC236}">
-                <a16:creationId xmlns:a16="http://schemas.microsoft.com/office/drawing/2014/main" id="{1673775F-1CB5-409D-BCDB-23A7D8C863F5}"/>
-              </a:ext>
-            </a:extLst>
-          </p:cNvPr>
-          <p:cNvSpPr txBox="1"/>
-          <p:nvPr/>
-        </p:nvSpPr>
-        <p:spPr>
-          <a:xfrm>
-            <a:off x="7703957" y="1990003"/>
-            <a:ext cx="3921986" cy="3139321"/>
-          </a:xfrm>
-          <a:prstGeom prst="rect">
-            <a:avLst/>
-          </a:prstGeom>
-          <a:noFill/>
-        </p:spPr>
-        <p:txBody>
-          <a:bodyPr wrap="square" rtlCol="0">
-            <a:spAutoFit/>
-          </a:bodyPr>
-          <a:lstStyle/>
-          <a:p>
-            <a:r>
-              <a:rPr lang="en-GB" dirty="0"/>
-              <a:t>Aim is to bring the brotherhood to our modern civil life. Why?</a:t>
-            </a:r>
-          </a:p>
-          <a:p>
-            <a:pPr marL="285750" indent="-285750">
-              <a:buFontTx/>
-              <a:buChar char="-"/>
-            </a:pPr>
-            <a:r>
-              <a:rPr lang="en-GB" dirty="0"/>
-              <a:t>Accelerate self-improvement via ‘proving each other that they deserve to be part of the team’ [6] (Background Research Section: Disadv of brotherhood)</a:t>
-            </a:r>
-          </a:p>
-          <a:p>
-            <a:pPr marL="285750" indent="-285750">
-              <a:buFontTx/>
-              <a:buChar char="-"/>
-            </a:pPr>
-            <a:r>
-              <a:rPr lang="en-GB" dirty="0"/>
-              <a:t>For well-being as claimed by [8] (Background Research Section: Adv of brotherhood)</a:t>
-            </a:r>
-          </a:p>
-          <a:p>
-            <a:pPr marL="285750" indent="-285750">
-              <a:buFontTx/>
-              <a:buChar char="-"/>
-            </a:pPr>
-            <a:endParaRPr lang="en-GB" dirty="0"/>
-          </a:p>
-        </p:txBody>
-      </p:sp>
-      <p:sp>
-        <p:nvSpPr>
-          <p:cNvPr id="3" name="TextBox 2">
-            <a:extLst>
-              <a:ext uri="{FF2B5EF4-FFF2-40B4-BE49-F238E27FC236}">
-                <a16:creationId xmlns:a16="http://schemas.microsoft.com/office/drawing/2014/main" id="{0D74DD5D-2D82-4F08-8DE8-7B94A3B8F2EB}"/>
-              </a:ext>
-            </a:extLst>
-          </p:cNvPr>
-          <p:cNvSpPr txBox="1"/>
-          <p:nvPr/>
-        </p:nvSpPr>
-        <p:spPr>
-          <a:xfrm>
-            <a:off x="838200" y="5571269"/>
-            <a:ext cx="689906" cy="366855"/>
-          </a:xfrm>
-          <a:prstGeom prst="rect">
-            <a:avLst/>
-          </a:prstGeom>
-          <a:noFill/>
-        </p:spPr>
-        <p:txBody>
-          <a:bodyPr wrap="square" rtlCol="0">
-            <a:spAutoFit/>
-          </a:bodyPr>
-          <a:lstStyle/>
-          <a:p>
-            <a:r>
-              <a:rPr lang="en-GB" dirty="0"/>
-              <a:t>[999]</a:t>
-            </a:r>
-          </a:p>
-        </p:txBody>
-      </p:sp>
-    </p:spTree>
-    <p:extLst>
-      <p:ext uri="{BB962C8B-B14F-4D97-AF65-F5344CB8AC3E}">
-        <p14:creationId xmlns:p14="http://schemas.microsoft.com/office/powerpoint/2010/main" val="2688071013"/>
-      </p:ext>
-    </p:extLst>
-  </p:cSld>
-  <p:clrMapOvr>
-    <a:masterClrMapping/>
-  </p:clrMapOvr>
-</p:sld>
-</file>
-
-<file path=ppt/slides/slide5.xml><?xml version="1.0" encoding="utf-8"?>
-<p:sld xmlns:a="http://schemas.openxmlformats.org/drawingml/2006/main" xmlns:r="http://schemas.openxmlformats.org/officeDocument/2006/relationships" xmlns:p="http://schemas.openxmlformats.org/presentationml/2006/main">
-  <p:cSld>
-    <p:spTree>
-      <p:nvGrpSpPr>
-        <p:cNvPr id="1" name=""/>
-        <p:cNvGrpSpPr/>
-        <p:nvPr/>
-      </p:nvGrpSpPr>
-      <p:grpSpPr>
-        <a:xfrm>
-          <a:off x="0" y="0"/>
-          <a:ext cx="0" cy="0"/>
-          <a:chOff x="0" y="0"/>
-          <a:chExt cx="0" cy="0"/>
-        </a:xfrm>
-      </p:grpSpPr>
-      <p:sp>
-        <p:nvSpPr>
-          <p:cNvPr id="3" name="Content Placeholder 2">
-            <a:extLst>
-              <a:ext uri="{FF2B5EF4-FFF2-40B4-BE49-F238E27FC236}">
-                <a16:creationId xmlns:a16="http://schemas.microsoft.com/office/drawing/2014/main" id="{CE367C91-F77F-4578-8FAC-5F00A41575D4}"/>
-              </a:ext>
-            </a:extLst>
-          </p:cNvPr>
-          <p:cNvSpPr>
-            <a:spLocks noGrp="1"/>
-          </p:cNvSpPr>
-          <p:nvPr>
-            <p:ph idx="1"/>
-          </p:nvPr>
-        </p:nvSpPr>
-        <p:spPr>
-          <a:xfrm>
-            <a:off x="838200" y="1020734"/>
-            <a:ext cx="10515600" cy="4351338"/>
-          </a:xfrm>
-        </p:spPr>
-        <p:txBody>
-          <a:bodyPr/>
-          <a:lstStyle/>
-          <a:p>
-            <a:r>
-              <a:rPr lang="en-GB" dirty="0"/>
-              <a:t>If brotherhood is so great why is it lost now?</a:t>
-            </a:r>
-          </a:p>
-          <a:p>
-            <a:r>
-              <a:rPr lang="en-GB" dirty="0"/>
-              <a:t>How have others gone about solving the lack of brotherhood in our society?</a:t>
-            </a:r>
-          </a:p>
-          <a:p>
-            <a:r>
-              <a:rPr lang="en-GB" dirty="0"/>
-              <a:t>Why building the app is one of the best way to solve it?</a:t>
-            </a:r>
-          </a:p>
-          <a:p>
-            <a:pPr lvl="1"/>
-            <a:r>
-              <a:rPr lang="en-GB" dirty="0"/>
-              <a:t>Finding the group/creating it is the hardest part</a:t>
-            </a:r>
-          </a:p>
-          <a:p>
-            <a:pPr lvl="1"/>
-            <a:r>
-              <a:rPr lang="en-GB" dirty="0"/>
-              <a:t>Takes long to find like-minded people</a:t>
-            </a:r>
-          </a:p>
-          <a:p>
-            <a:pPr lvl="1"/>
-            <a:r>
-              <a:rPr lang="en-GB" dirty="0"/>
-              <a:t>‘Conscious deliberate effort’</a:t>
-            </a:r>
-          </a:p>
-          <a:p>
-            <a:pPr lvl="1"/>
-            <a:r>
-              <a:rPr lang="en-GB" dirty="0"/>
-              <a:t>Acts as an advert/promotion</a:t>
-            </a:r>
-          </a:p>
-          <a:p>
-            <a:endParaRPr lang="en-GB" dirty="0"/>
-          </a:p>
-        </p:txBody>
-      </p:sp>
-    </p:spTree>
-    <p:extLst>
-      <p:ext uri="{BB962C8B-B14F-4D97-AF65-F5344CB8AC3E}">
-        <p14:creationId xmlns:p14="http://schemas.microsoft.com/office/powerpoint/2010/main" val="1475443335"/>
       </p:ext>
     </p:extLst>
   </p:cSld>

</xml_diff>